<commit_message>
Add comments of PPT
</commit_message>
<xml_diff>
--- a/類神經網路期末報告(0604).pptx
+++ b/類神經網路期末報告(0604).pptx
@@ -225,7 +225,7 @@
           <a:p>
             <a:fld id="{E1A1EDBE-7313-481A-B2BC-FEFE62A71081}" type="datetimeFigureOut">
               <a:rPr lang="zh-TW" altLang="en-US" smtClean="0"/>
-              <a:t>2025/6/4</a:t>
+              <a:t>2025/6/5</a:t>
             </a:fld>
             <a:endParaRPr lang="zh-TW" altLang="en-US"/>
           </a:p>
@@ -492,6 +492,2941 @@
 </p:notesMaster>
 </file>
 
+<file path=ppt/notesSlides/notesSlide1.xml><?xml version="1.0" encoding="utf-8"?>
+<p:notes xmlns:a="http://schemas.openxmlformats.org/drawingml/2006/main" xmlns:r="http://schemas.openxmlformats.org/officeDocument/2006/relationships" xmlns:p="http://schemas.openxmlformats.org/presentationml/2006/main">
+  <p:cSld>
+    <p:spTree>
+      <p:nvGrpSpPr>
+        <p:cNvPr id="1" name=""/>
+        <p:cNvGrpSpPr/>
+        <p:nvPr/>
+      </p:nvGrpSpPr>
+      <p:grpSpPr>
+        <a:xfrm>
+          <a:off x="0" y="0"/>
+          <a:ext cx="0" cy="0"/>
+          <a:chOff x="0" y="0"/>
+          <a:chExt cx="0" cy="0"/>
+        </a:xfrm>
+      </p:grpSpPr>
+      <p:sp>
+        <p:nvSpPr>
+          <p:cNvPr id="2" name="投影片影像版面配置區 1"/>
+          <p:cNvSpPr>
+            <a:spLocks noGrp="1" noRot="1" noChangeAspect="1"/>
+          </p:cNvSpPr>
+          <p:nvPr>
+            <p:ph type="sldImg"/>
+          </p:nvPr>
+        </p:nvSpPr>
+        <p:spPr/>
+      </p:sp>
+      <p:sp>
+        <p:nvSpPr>
+          <p:cNvPr id="3" name="備忘稿版面配置區 2"/>
+          <p:cNvSpPr>
+            <a:spLocks noGrp="1"/>
+          </p:cNvSpPr>
+          <p:nvPr>
+            <p:ph type="body" idx="1"/>
+          </p:nvPr>
+        </p:nvSpPr>
+        <p:spPr/>
+        <p:txBody>
+          <a:bodyPr/>
+          <a:lstStyle/>
+          <a:p>
+            <a:r>
+              <a:rPr lang="zh-TW" altLang="en-US" dirty="0"/>
+              <a:t>大家好，我們今天要分享的主題是</a:t>
+            </a:r>
+            <a:r>
+              <a:rPr lang="en-US" altLang="zh-TW" dirty="0"/>
+              <a:t>《</a:t>
+            </a:r>
+            <a:r>
+              <a:rPr lang="zh-TW" altLang="en-US" dirty="0"/>
+              <a:t>基於算子普遍逼近定理的 </a:t>
+            </a:r>
+            <a:r>
+              <a:rPr lang="en-US" altLang="zh-TW" dirty="0" err="1"/>
+              <a:t>DeepONet</a:t>
+            </a:r>
+            <a:r>
+              <a:rPr lang="en-US" altLang="zh-TW" dirty="0"/>
+              <a:t> </a:t>
+            </a:r>
+            <a:r>
+              <a:rPr lang="zh-TW" altLang="en-US" dirty="0"/>
+              <a:t>非線性算子學習</a:t>
+            </a:r>
+            <a:r>
+              <a:rPr lang="en-US" altLang="zh-TW" dirty="0"/>
+              <a:t>》</a:t>
+            </a:r>
+            <a:r>
+              <a:rPr lang="zh-TW" altLang="en-US" dirty="0"/>
+              <a:t>。這篇研究是發表在 </a:t>
+            </a:r>
+            <a:r>
+              <a:rPr lang="en-US" altLang="zh-TW" dirty="0"/>
+              <a:t>2021 </a:t>
+            </a:r>
+            <a:r>
+              <a:rPr lang="zh-TW" altLang="en-US" dirty="0"/>
+              <a:t>年</a:t>
+            </a:r>
+            <a:r>
+              <a:rPr lang="en-US" altLang="zh-TW" dirty="0"/>
+              <a:t>《Nature Machine Intelligence》</a:t>
+            </a:r>
+            <a:r>
+              <a:rPr lang="zh-TW" altLang="en-US" dirty="0"/>
+              <a:t>期刊，由 </a:t>
+            </a:r>
+            <a:r>
+              <a:rPr lang="en-US" altLang="zh-TW" dirty="0"/>
+              <a:t>Brown University </a:t>
+            </a:r>
+            <a:r>
+              <a:rPr lang="zh-TW" altLang="en-US" dirty="0"/>
+              <a:t>的 </a:t>
+            </a:r>
+            <a:r>
+              <a:rPr lang="en-US" altLang="zh-TW" dirty="0"/>
+              <a:t>Lu </a:t>
+            </a:r>
+            <a:r>
+              <a:rPr lang="en-US" altLang="zh-TW" dirty="0" err="1"/>
+              <a:t>Lu</a:t>
+            </a:r>
+            <a:r>
+              <a:rPr lang="zh-TW" altLang="en-US" dirty="0"/>
+              <a:t>、</a:t>
+            </a:r>
+            <a:r>
+              <a:rPr lang="en-US" altLang="zh-TW" dirty="0" err="1"/>
+              <a:t>Pengzhan</a:t>
+            </a:r>
+            <a:r>
+              <a:rPr lang="en-US" altLang="zh-TW" dirty="0"/>
+              <a:t> </a:t>
+            </a:r>
+            <a:r>
+              <a:rPr lang="en-US" altLang="zh-TW" dirty="0" err="1"/>
+              <a:t>Jin</a:t>
+            </a:r>
+            <a:r>
+              <a:rPr lang="en-US" altLang="zh-TW" dirty="0"/>
+              <a:t> </a:t>
+            </a:r>
+            <a:r>
+              <a:rPr lang="zh-TW" altLang="en-US" dirty="0"/>
+              <a:t>和 </a:t>
+            </a:r>
+            <a:r>
+              <a:rPr lang="en-US" altLang="zh-TW" dirty="0"/>
+              <a:t>George </a:t>
+            </a:r>
+            <a:r>
+              <a:rPr lang="en-US" altLang="zh-TW" dirty="0" err="1"/>
+              <a:t>Karniadakis</a:t>
+            </a:r>
+            <a:r>
+              <a:rPr lang="en-US" altLang="zh-TW" dirty="0"/>
+              <a:t> </a:t>
+            </a:r>
+            <a:r>
+              <a:rPr lang="zh-TW" altLang="en-US" dirty="0"/>
+              <a:t>等人提出。我們組員包括張信中、劉柏本和謝政廷。</a:t>
+            </a:r>
+          </a:p>
+        </p:txBody>
+      </p:sp>
+      <p:sp>
+        <p:nvSpPr>
+          <p:cNvPr id="4" name="投影片編號版面配置區 3"/>
+          <p:cNvSpPr>
+            <a:spLocks noGrp="1"/>
+          </p:cNvSpPr>
+          <p:nvPr>
+            <p:ph type="sldNum" sz="quarter" idx="5"/>
+          </p:nvPr>
+        </p:nvSpPr>
+        <p:spPr/>
+        <p:txBody>
+          <a:bodyPr/>
+          <a:lstStyle/>
+          <a:p>
+            <a:fld id="{53F37B9E-6BA1-42D6-AAD5-58D48F5C5ABC}" type="slidenum">
+              <a:rPr lang="zh-TW" altLang="en-US" smtClean="0"/>
+              <a:t>1</a:t>
+            </a:fld>
+            <a:endParaRPr lang="zh-TW" altLang="en-US"/>
+          </a:p>
+        </p:txBody>
+      </p:sp>
+    </p:spTree>
+    <p:extLst>
+      <p:ext uri="{BB962C8B-B14F-4D97-AF65-F5344CB8AC3E}">
+        <p14:creationId xmlns:p14="http://schemas.microsoft.com/office/powerpoint/2010/main" val="1260044571"/>
+      </p:ext>
+    </p:extLst>
+  </p:cSld>
+  <p:clrMapOvr>
+    <a:masterClrMapping/>
+  </p:clrMapOvr>
+</p:notes>
+</file>
+
+<file path=ppt/notesSlides/notesSlide10.xml><?xml version="1.0" encoding="utf-8"?>
+<p:notes xmlns:a="http://schemas.openxmlformats.org/drawingml/2006/main" xmlns:r="http://schemas.openxmlformats.org/officeDocument/2006/relationships" xmlns:p="http://schemas.openxmlformats.org/presentationml/2006/main">
+  <p:cSld>
+    <p:spTree>
+      <p:nvGrpSpPr>
+        <p:cNvPr id="1" name=""/>
+        <p:cNvGrpSpPr/>
+        <p:nvPr/>
+      </p:nvGrpSpPr>
+      <p:grpSpPr>
+        <a:xfrm>
+          <a:off x="0" y="0"/>
+          <a:ext cx="0" cy="0"/>
+          <a:chOff x="0" y="0"/>
+          <a:chExt cx="0" cy="0"/>
+        </a:xfrm>
+      </p:grpSpPr>
+      <p:sp>
+        <p:nvSpPr>
+          <p:cNvPr id="2" name="投影片影像版面配置區 1"/>
+          <p:cNvSpPr>
+            <a:spLocks noGrp="1" noRot="1" noChangeAspect="1"/>
+          </p:cNvSpPr>
+          <p:nvPr>
+            <p:ph type="sldImg"/>
+          </p:nvPr>
+        </p:nvSpPr>
+        <p:spPr/>
+      </p:sp>
+      <p:sp>
+        <p:nvSpPr>
+          <p:cNvPr id="3" name="備忘稿版面配置區 2"/>
+          <p:cNvSpPr>
+            <a:spLocks noGrp="1"/>
+          </p:cNvSpPr>
+          <p:nvPr>
+            <p:ph type="body" idx="1"/>
+          </p:nvPr>
+        </p:nvSpPr>
+        <p:spPr/>
+        <p:txBody>
+          <a:bodyPr/>
+          <a:lstStyle/>
+          <a:p>
+            <a:r>
+              <a:rPr lang="zh-TW" altLang="en-US" dirty="0"/>
+              <a:t>論文中也證明了 </a:t>
+            </a:r>
+            <a:r>
+              <a:rPr lang="en-US" altLang="zh-TW" dirty="0" err="1"/>
+              <a:t>DeepONet</a:t>
+            </a:r>
+            <a:r>
+              <a:rPr lang="en-US" altLang="zh-TW" dirty="0"/>
+              <a:t> </a:t>
+            </a:r>
+            <a:r>
+              <a:rPr lang="zh-TW" altLang="en-US" dirty="0"/>
+              <a:t>可以逼近任意的算子，這個結果是建立在算子通用近似定理之上。也就是說，只要有足夠的資料和網路容量，</a:t>
+            </a:r>
+            <a:r>
+              <a:rPr lang="en-US" altLang="zh-TW" dirty="0" err="1"/>
+              <a:t>DeepONet</a:t>
+            </a:r>
+            <a:r>
+              <a:rPr lang="en-US" altLang="zh-TW" dirty="0"/>
+              <a:t> </a:t>
+            </a:r>
+            <a:r>
+              <a:rPr lang="zh-TW" altLang="en-US" dirty="0"/>
+              <a:t>就有能力學習任何從函數到函數的映射。</a:t>
+            </a:r>
+          </a:p>
+        </p:txBody>
+      </p:sp>
+      <p:sp>
+        <p:nvSpPr>
+          <p:cNvPr id="4" name="投影片編號版面配置區 3"/>
+          <p:cNvSpPr>
+            <a:spLocks noGrp="1"/>
+          </p:cNvSpPr>
+          <p:nvPr>
+            <p:ph type="sldNum" sz="quarter" idx="5"/>
+          </p:nvPr>
+        </p:nvSpPr>
+        <p:spPr/>
+        <p:txBody>
+          <a:bodyPr/>
+          <a:lstStyle/>
+          <a:p>
+            <a:fld id="{53F37B9E-6BA1-42D6-AAD5-58D48F5C5ABC}" type="slidenum">
+              <a:rPr lang="zh-TW" altLang="en-US" smtClean="0"/>
+              <a:t>10</a:t>
+            </a:fld>
+            <a:endParaRPr lang="zh-TW" altLang="en-US"/>
+          </a:p>
+        </p:txBody>
+      </p:sp>
+    </p:spTree>
+    <p:extLst>
+      <p:ext uri="{BB962C8B-B14F-4D97-AF65-F5344CB8AC3E}">
+        <p14:creationId xmlns:p14="http://schemas.microsoft.com/office/powerpoint/2010/main" val="438367529"/>
+      </p:ext>
+    </p:extLst>
+  </p:cSld>
+  <p:clrMapOvr>
+    <a:masterClrMapping/>
+  </p:clrMapOvr>
+</p:notes>
+</file>
+
+<file path=ppt/notesSlides/notesSlide11.xml><?xml version="1.0" encoding="utf-8"?>
+<p:notes xmlns:a="http://schemas.openxmlformats.org/drawingml/2006/main" xmlns:r="http://schemas.openxmlformats.org/officeDocument/2006/relationships" xmlns:p="http://schemas.openxmlformats.org/presentationml/2006/main">
+  <p:cSld>
+    <p:spTree>
+      <p:nvGrpSpPr>
+        <p:cNvPr id="1" name=""/>
+        <p:cNvGrpSpPr/>
+        <p:nvPr/>
+      </p:nvGrpSpPr>
+      <p:grpSpPr>
+        <a:xfrm>
+          <a:off x="0" y="0"/>
+          <a:ext cx="0" cy="0"/>
+          <a:chOff x="0" y="0"/>
+          <a:chExt cx="0" cy="0"/>
+        </a:xfrm>
+      </p:grpSpPr>
+      <p:sp>
+        <p:nvSpPr>
+          <p:cNvPr id="2" name="投影片影像版面配置區 1"/>
+          <p:cNvSpPr>
+            <a:spLocks noGrp="1" noRot="1" noChangeAspect="1"/>
+          </p:cNvSpPr>
+          <p:nvPr>
+            <p:ph type="sldImg"/>
+          </p:nvPr>
+        </p:nvSpPr>
+        <p:spPr/>
+      </p:sp>
+      <p:sp>
+        <p:nvSpPr>
+          <p:cNvPr id="3" name="備忘稿版面配置區 2"/>
+          <p:cNvSpPr>
+            <a:spLocks noGrp="1"/>
+          </p:cNvSpPr>
+          <p:nvPr>
+            <p:ph type="body" idx="1"/>
+          </p:nvPr>
+        </p:nvSpPr>
+        <p:spPr/>
+        <p:txBody>
+          <a:bodyPr/>
+          <a:lstStyle/>
+          <a:p>
+            <a:r>
+              <a:rPr lang="zh-TW" altLang="en-US" dirty="0"/>
+              <a:t>雖然 </a:t>
+            </a:r>
+            <a:r>
+              <a:rPr lang="en-US" altLang="zh-TW" dirty="0" err="1"/>
+              <a:t>DeepONet</a:t>
+            </a:r>
+            <a:r>
+              <a:rPr lang="en-US" altLang="zh-TW" dirty="0"/>
+              <a:t> </a:t>
+            </a:r>
+            <a:r>
+              <a:rPr lang="zh-TW" altLang="en-US" dirty="0"/>
+              <a:t>架構很強大，但它的挑戰之一是訓練資料的取得。因為我們要的是函數對的資料，而這種資料在真實世界中不容易收集，所以研究者採用了隨機函數生成器來產生訓練資料。</a:t>
+            </a:r>
+          </a:p>
+        </p:txBody>
+      </p:sp>
+      <p:sp>
+        <p:nvSpPr>
+          <p:cNvPr id="4" name="投影片編號版面配置區 3"/>
+          <p:cNvSpPr>
+            <a:spLocks noGrp="1"/>
+          </p:cNvSpPr>
+          <p:nvPr>
+            <p:ph type="sldNum" sz="quarter" idx="5"/>
+          </p:nvPr>
+        </p:nvSpPr>
+        <p:spPr/>
+        <p:txBody>
+          <a:bodyPr/>
+          <a:lstStyle/>
+          <a:p>
+            <a:fld id="{53F37B9E-6BA1-42D6-AAD5-58D48F5C5ABC}" type="slidenum">
+              <a:rPr lang="zh-TW" altLang="en-US" smtClean="0"/>
+              <a:t>11</a:t>
+            </a:fld>
+            <a:endParaRPr lang="zh-TW" altLang="en-US"/>
+          </a:p>
+        </p:txBody>
+      </p:sp>
+    </p:spTree>
+    <p:extLst>
+      <p:ext uri="{BB962C8B-B14F-4D97-AF65-F5344CB8AC3E}">
+        <p14:creationId xmlns:p14="http://schemas.microsoft.com/office/powerpoint/2010/main" val="1207432278"/>
+      </p:ext>
+    </p:extLst>
+  </p:cSld>
+  <p:clrMapOvr>
+    <a:masterClrMapping/>
+  </p:clrMapOvr>
+</p:notes>
+</file>
+
+<file path=ppt/notesSlides/notesSlide12.xml><?xml version="1.0" encoding="utf-8"?>
+<p:notes xmlns:a="http://schemas.openxmlformats.org/drawingml/2006/main" xmlns:r="http://schemas.openxmlformats.org/officeDocument/2006/relationships" xmlns:p="http://schemas.openxmlformats.org/presentationml/2006/main">
+  <p:cSld>
+    <p:spTree>
+      <p:nvGrpSpPr>
+        <p:cNvPr id="1" name=""/>
+        <p:cNvGrpSpPr/>
+        <p:nvPr/>
+      </p:nvGrpSpPr>
+      <p:grpSpPr>
+        <a:xfrm>
+          <a:off x="0" y="0"/>
+          <a:ext cx="0" cy="0"/>
+          <a:chOff x="0" y="0"/>
+          <a:chExt cx="0" cy="0"/>
+        </a:xfrm>
+      </p:grpSpPr>
+      <p:sp>
+        <p:nvSpPr>
+          <p:cNvPr id="2" name="投影片影像版面配置區 1"/>
+          <p:cNvSpPr>
+            <a:spLocks noGrp="1" noRot="1" noChangeAspect="1"/>
+          </p:cNvSpPr>
+          <p:nvPr>
+            <p:ph type="sldImg"/>
+          </p:nvPr>
+        </p:nvSpPr>
+        <p:spPr/>
+      </p:sp>
+      <p:sp>
+        <p:nvSpPr>
+          <p:cNvPr id="3" name="備忘稿版面配置區 2"/>
+          <p:cNvSpPr>
+            <a:spLocks noGrp="1"/>
+          </p:cNvSpPr>
+          <p:nvPr>
+            <p:ph type="body" idx="1"/>
+          </p:nvPr>
+        </p:nvSpPr>
+        <p:spPr/>
+        <p:txBody>
+          <a:bodyPr/>
+          <a:lstStyle/>
+          <a:p>
+            <a:pPr marL="0" marR="0" lvl="0" indent="0" algn="l" defTabSz="914400" rtl="0" eaLnBrk="1" fontAlgn="auto" latinLnBrk="0" hangingPunct="1">
+              <a:lnSpc>
+                <a:spcPct val="100000"/>
+              </a:lnSpc>
+              <a:spcBef>
+                <a:spcPts val="0"/>
+              </a:spcBef>
+              <a:spcAft>
+                <a:spcPts val="0"/>
+              </a:spcAft>
+              <a:buClrTx/>
+              <a:buSzTx/>
+              <a:buFontTx/>
+              <a:buNone/>
+              <a:tabLst/>
+              <a:defRPr/>
+            </a:pPr>
+            <a:r>
+              <a:rPr lang="zh-TW" altLang="en-US" dirty="0"/>
+              <a:t>他們使用了兩種主要的方法來生成訓練資料：一是 </a:t>
+            </a:r>
+            <a:r>
+              <a:rPr lang="en-US" altLang="zh-TW" dirty="0"/>
+              <a:t>Gaussian </a:t>
+            </a:r>
+            <a:r>
+              <a:rPr lang="zh-TW" altLang="en-US" dirty="0"/>
+              <a:t>隨機場，</a:t>
+            </a:r>
+          </a:p>
+        </p:txBody>
+      </p:sp>
+      <p:sp>
+        <p:nvSpPr>
+          <p:cNvPr id="4" name="投影片編號版面配置區 3"/>
+          <p:cNvSpPr>
+            <a:spLocks noGrp="1"/>
+          </p:cNvSpPr>
+          <p:nvPr>
+            <p:ph type="sldNum" sz="quarter" idx="5"/>
+          </p:nvPr>
+        </p:nvSpPr>
+        <p:spPr/>
+        <p:txBody>
+          <a:bodyPr/>
+          <a:lstStyle/>
+          <a:p>
+            <a:fld id="{53F37B9E-6BA1-42D6-AAD5-58D48F5C5ABC}" type="slidenum">
+              <a:rPr lang="zh-TW" altLang="en-US" smtClean="0"/>
+              <a:t>12</a:t>
+            </a:fld>
+            <a:endParaRPr lang="zh-TW" altLang="en-US"/>
+          </a:p>
+        </p:txBody>
+      </p:sp>
+    </p:spTree>
+    <p:extLst>
+      <p:ext uri="{BB962C8B-B14F-4D97-AF65-F5344CB8AC3E}">
+        <p14:creationId xmlns:p14="http://schemas.microsoft.com/office/powerpoint/2010/main" val="1620572911"/>
+      </p:ext>
+    </p:extLst>
+  </p:cSld>
+  <p:clrMapOvr>
+    <a:masterClrMapping/>
+  </p:clrMapOvr>
+</p:notes>
+</file>
+
+<file path=ppt/notesSlides/notesSlide13.xml><?xml version="1.0" encoding="utf-8"?>
+<p:notes xmlns:a="http://schemas.openxmlformats.org/drawingml/2006/main" xmlns:r="http://schemas.openxmlformats.org/officeDocument/2006/relationships" xmlns:p="http://schemas.openxmlformats.org/presentationml/2006/main">
+  <p:cSld>
+    <p:spTree>
+      <p:nvGrpSpPr>
+        <p:cNvPr id="1" name=""/>
+        <p:cNvGrpSpPr/>
+        <p:nvPr/>
+      </p:nvGrpSpPr>
+      <p:grpSpPr>
+        <a:xfrm>
+          <a:off x="0" y="0"/>
+          <a:ext cx="0" cy="0"/>
+          <a:chOff x="0" y="0"/>
+          <a:chExt cx="0" cy="0"/>
+        </a:xfrm>
+      </p:grpSpPr>
+      <p:sp>
+        <p:nvSpPr>
+          <p:cNvPr id="2" name="投影片影像版面配置區 1"/>
+          <p:cNvSpPr>
+            <a:spLocks noGrp="1" noRot="1" noChangeAspect="1"/>
+          </p:cNvSpPr>
+          <p:nvPr>
+            <p:ph type="sldImg"/>
+          </p:nvPr>
+        </p:nvSpPr>
+        <p:spPr/>
+      </p:sp>
+      <p:sp>
+        <p:nvSpPr>
+          <p:cNvPr id="3" name="備忘稿版面配置區 2"/>
+          <p:cNvSpPr>
+            <a:spLocks noGrp="1"/>
+          </p:cNvSpPr>
+          <p:nvPr>
+            <p:ph type="body" idx="1"/>
+          </p:nvPr>
+        </p:nvSpPr>
+        <p:spPr/>
+        <p:txBody>
+          <a:bodyPr/>
+          <a:lstStyle/>
+          <a:p>
+            <a:pPr marL="0" marR="0" lvl="0" indent="0" algn="l" defTabSz="914400" rtl="0" eaLnBrk="1" fontAlgn="auto" latinLnBrk="0" hangingPunct="1">
+              <a:lnSpc>
+                <a:spcPct val="100000"/>
+              </a:lnSpc>
+              <a:spcBef>
+                <a:spcPts val="0"/>
+              </a:spcBef>
+              <a:spcAft>
+                <a:spcPts val="0"/>
+              </a:spcAft>
+              <a:buClrTx/>
+              <a:buSzTx/>
+              <a:buFontTx/>
+              <a:buNone/>
+              <a:tabLst/>
+              <a:defRPr/>
+            </a:pPr>
+            <a:r>
+              <a:rPr lang="zh-TW" altLang="en-US" dirty="0"/>
+              <a:t>另一種是 </a:t>
+            </a:r>
+            <a:r>
+              <a:rPr lang="en-US" altLang="zh-TW" dirty="0"/>
+              <a:t>Chebyshev </a:t>
+            </a:r>
+            <a:r>
+              <a:rPr lang="zh-TW" altLang="en-US" dirty="0"/>
+              <a:t>多項式，這些都是可以系統性產生多樣函數的方式。</a:t>
+            </a:r>
+          </a:p>
+          <a:p>
+            <a:endParaRPr lang="zh-TW" altLang="en-US" dirty="0"/>
+          </a:p>
+        </p:txBody>
+      </p:sp>
+      <p:sp>
+        <p:nvSpPr>
+          <p:cNvPr id="4" name="投影片編號版面配置區 3"/>
+          <p:cNvSpPr>
+            <a:spLocks noGrp="1"/>
+          </p:cNvSpPr>
+          <p:nvPr>
+            <p:ph type="sldNum" sz="quarter" idx="5"/>
+          </p:nvPr>
+        </p:nvSpPr>
+        <p:spPr/>
+        <p:txBody>
+          <a:bodyPr/>
+          <a:lstStyle/>
+          <a:p>
+            <a:fld id="{53F37B9E-6BA1-42D6-AAD5-58D48F5C5ABC}" type="slidenum">
+              <a:rPr lang="zh-TW" altLang="en-US" smtClean="0"/>
+              <a:t>13</a:t>
+            </a:fld>
+            <a:endParaRPr lang="zh-TW" altLang="en-US"/>
+          </a:p>
+        </p:txBody>
+      </p:sp>
+    </p:spTree>
+    <p:extLst>
+      <p:ext uri="{BB962C8B-B14F-4D97-AF65-F5344CB8AC3E}">
+        <p14:creationId xmlns:p14="http://schemas.microsoft.com/office/powerpoint/2010/main" val="2955150034"/>
+      </p:ext>
+    </p:extLst>
+  </p:cSld>
+  <p:clrMapOvr>
+    <a:masterClrMapping/>
+  </p:clrMapOvr>
+</p:notes>
+</file>
+
+<file path=ppt/notesSlides/notesSlide14.xml><?xml version="1.0" encoding="utf-8"?>
+<p:notes xmlns:a="http://schemas.openxmlformats.org/drawingml/2006/main" xmlns:r="http://schemas.openxmlformats.org/officeDocument/2006/relationships" xmlns:p="http://schemas.openxmlformats.org/presentationml/2006/main">
+  <p:cSld>
+    <p:spTree>
+      <p:nvGrpSpPr>
+        <p:cNvPr id="1" name=""/>
+        <p:cNvGrpSpPr/>
+        <p:nvPr/>
+      </p:nvGrpSpPr>
+      <p:grpSpPr>
+        <a:xfrm>
+          <a:off x="0" y="0"/>
+          <a:ext cx="0" cy="0"/>
+          <a:chOff x="0" y="0"/>
+          <a:chExt cx="0" cy="0"/>
+        </a:xfrm>
+      </p:grpSpPr>
+      <p:sp>
+        <p:nvSpPr>
+          <p:cNvPr id="2" name="投影片影像版面配置區 1"/>
+          <p:cNvSpPr>
+            <a:spLocks noGrp="1" noRot="1" noChangeAspect="1"/>
+          </p:cNvSpPr>
+          <p:nvPr>
+            <p:ph type="sldImg"/>
+          </p:nvPr>
+        </p:nvSpPr>
+        <p:spPr/>
+      </p:sp>
+      <p:sp>
+        <p:nvSpPr>
+          <p:cNvPr id="3" name="備忘稿版面配置區 2"/>
+          <p:cNvSpPr>
+            <a:spLocks noGrp="1"/>
+          </p:cNvSpPr>
+          <p:nvPr>
+            <p:ph type="body" idx="1"/>
+          </p:nvPr>
+        </p:nvSpPr>
+        <p:spPr/>
+        <p:txBody>
+          <a:bodyPr/>
+          <a:lstStyle/>
+          <a:p>
+            <a:r>
+              <a:rPr lang="zh-TW" altLang="en-US" dirty="0"/>
+              <a:t>除了理論證明，他們也實際分析了收斂行為，證明 </a:t>
+            </a:r>
+            <a:r>
+              <a:rPr lang="en-US" altLang="zh-TW" dirty="0" err="1"/>
+              <a:t>DeepONet</a:t>
+            </a:r>
+            <a:r>
+              <a:rPr lang="en-US" altLang="zh-TW" dirty="0"/>
+              <a:t> </a:t>
+            </a:r>
+            <a:r>
+              <a:rPr lang="zh-TW" altLang="en-US" dirty="0"/>
+              <a:t>的逼近能力會隨著訓練資料量與模型容量增加而提升。</a:t>
+            </a:r>
+          </a:p>
+        </p:txBody>
+      </p:sp>
+      <p:sp>
+        <p:nvSpPr>
+          <p:cNvPr id="4" name="投影片編號版面配置區 3"/>
+          <p:cNvSpPr>
+            <a:spLocks noGrp="1"/>
+          </p:cNvSpPr>
+          <p:nvPr>
+            <p:ph type="sldNum" sz="quarter" idx="5"/>
+          </p:nvPr>
+        </p:nvSpPr>
+        <p:spPr/>
+        <p:txBody>
+          <a:bodyPr/>
+          <a:lstStyle/>
+          <a:p>
+            <a:fld id="{53F37B9E-6BA1-42D6-AAD5-58D48F5C5ABC}" type="slidenum">
+              <a:rPr lang="zh-TW" altLang="en-US" smtClean="0"/>
+              <a:t>14</a:t>
+            </a:fld>
+            <a:endParaRPr lang="zh-TW" altLang="en-US"/>
+          </a:p>
+        </p:txBody>
+      </p:sp>
+    </p:spTree>
+    <p:extLst>
+      <p:ext uri="{BB962C8B-B14F-4D97-AF65-F5344CB8AC3E}">
+        <p14:creationId xmlns:p14="http://schemas.microsoft.com/office/powerpoint/2010/main" val="1566849217"/>
+      </p:ext>
+    </p:extLst>
+  </p:cSld>
+  <p:clrMapOvr>
+    <a:masterClrMapping/>
+  </p:clrMapOvr>
+</p:notes>
+</file>
+
+<file path=ppt/notesSlides/notesSlide15.xml><?xml version="1.0" encoding="utf-8"?>
+<p:notes xmlns:a="http://schemas.openxmlformats.org/drawingml/2006/main" xmlns:r="http://schemas.openxmlformats.org/officeDocument/2006/relationships" xmlns:p="http://schemas.openxmlformats.org/presentationml/2006/main">
+  <p:cSld>
+    <p:spTree>
+      <p:nvGrpSpPr>
+        <p:cNvPr id="1" name=""/>
+        <p:cNvGrpSpPr/>
+        <p:nvPr/>
+      </p:nvGrpSpPr>
+      <p:grpSpPr>
+        <a:xfrm>
+          <a:off x="0" y="0"/>
+          <a:ext cx="0" cy="0"/>
+          <a:chOff x="0" y="0"/>
+          <a:chExt cx="0" cy="0"/>
+        </a:xfrm>
+      </p:grpSpPr>
+      <p:sp>
+        <p:nvSpPr>
+          <p:cNvPr id="2" name="投影片影像版面配置區 1"/>
+          <p:cNvSpPr>
+            <a:spLocks noGrp="1" noRot="1" noChangeAspect="1"/>
+          </p:cNvSpPr>
+          <p:nvPr>
+            <p:ph type="sldImg"/>
+          </p:nvPr>
+        </p:nvSpPr>
+        <p:spPr/>
+      </p:sp>
+      <p:sp>
+        <p:nvSpPr>
+          <p:cNvPr id="3" name="備忘稿版面配置區 2"/>
+          <p:cNvSpPr>
+            <a:spLocks noGrp="1"/>
+          </p:cNvSpPr>
+          <p:nvPr>
+            <p:ph type="body" idx="1"/>
+          </p:nvPr>
+        </p:nvSpPr>
+        <p:spPr/>
+        <p:txBody>
+          <a:bodyPr/>
+          <a:lstStyle/>
+          <a:p>
+            <a:r>
+              <a:rPr lang="zh-TW" altLang="en-US" dirty="0"/>
+              <a:t>第一個驗證是積分算子的學習，實驗顯示 </a:t>
+            </a:r>
+            <a:r>
+              <a:rPr lang="en-US" altLang="zh-TW" dirty="0" err="1"/>
+              <a:t>DeepONet</a:t>
+            </a:r>
+            <a:r>
+              <a:rPr lang="en-US" altLang="zh-TW" dirty="0"/>
+              <a:t> </a:t>
+            </a:r>
+            <a:r>
+              <a:rPr lang="zh-TW" altLang="en-US" dirty="0"/>
+              <a:t>在資料較少時，仍然比 </a:t>
+            </a:r>
+            <a:r>
+              <a:rPr lang="en-US" altLang="zh-TW" dirty="0"/>
+              <a:t>FNN</a:t>
+            </a:r>
+            <a:r>
+              <a:rPr lang="zh-TW" altLang="en-US" dirty="0"/>
+              <a:t>、</a:t>
+            </a:r>
+            <a:r>
+              <a:rPr lang="en-US" altLang="zh-TW" dirty="0" err="1"/>
+              <a:t>ResNet</a:t>
+            </a:r>
+            <a:r>
+              <a:rPr lang="en-US" altLang="zh-TW" dirty="0"/>
+              <a:t> </a:t>
+            </a:r>
+            <a:r>
+              <a:rPr lang="zh-TW" altLang="en-US" dirty="0"/>
+              <a:t>和 </a:t>
+            </a:r>
+            <a:r>
+              <a:rPr lang="en-US" altLang="zh-TW" dirty="0"/>
+              <a:t>Seq2Seq </a:t>
+            </a:r>
+            <a:r>
+              <a:rPr lang="zh-TW" altLang="en-US" dirty="0"/>
+              <a:t>架構有更低的誤差。</a:t>
+            </a:r>
+          </a:p>
+        </p:txBody>
+      </p:sp>
+      <p:sp>
+        <p:nvSpPr>
+          <p:cNvPr id="4" name="投影片編號版面配置區 3"/>
+          <p:cNvSpPr>
+            <a:spLocks noGrp="1"/>
+          </p:cNvSpPr>
+          <p:nvPr>
+            <p:ph type="sldNum" sz="quarter" idx="5"/>
+          </p:nvPr>
+        </p:nvSpPr>
+        <p:spPr/>
+        <p:txBody>
+          <a:bodyPr/>
+          <a:lstStyle/>
+          <a:p>
+            <a:fld id="{53F37B9E-6BA1-42D6-AAD5-58D48F5C5ABC}" type="slidenum">
+              <a:rPr lang="zh-TW" altLang="en-US" smtClean="0"/>
+              <a:t>17</a:t>
+            </a:fld>
+            <a:endParaRPr lang="zh-TW" altLang="en-US"/>
+          </a:p>
+        </p:txBody>
+      </p:sp>
+    </p:spTree>
+    <p:extLst>
+      <p:ext uri="{BB962C8B-B14F-4D97-AF65-F5344CB8AC3E}">
+        <p14:creationId xmlns:p14="http://schemas.microsoft.com/office/powerpoint/2010/main" val="3593888167"/>
+      </p:ext>
+    </p:extLst>
+  </p:cSld>
+  <p:clrMapOvr>
+    <a:masterClrMapping/>
+  </p:clrMapOvr>
+</p:notes>
+</file>
+
+<file path=ppt/notesSlides/notesSlide16.xml><?xml version="1.0" encoding="utf-8"?>
+<p:notes xmlns:a="http://schemas.openxmlformats.org/drawingml/2006/main" xmlns:r="http://schemas.openxmlformats.org/officeDocument/2006/relationships" xmlns:p="http://schemas.openxmlformats.org/presentationml/2006/main">
+  <p:cSld>
+    <p:spTree>
+      <p:nvGrpSpPr>
+        <p:cNvPr id="1" name=""/>
+        <p:cNvGrpSpPr/>
+        <p:nvPr/>
+      </p:nvGrpSpPr>
+      <p:grpSpPr>
+        <a:xfrm>
+          <a:off x="0" y="0"/>
+          <a:ext cx="0" cy="0"/>
+          <a:chOff x="0" y="0"/>
+          <a:chExt cx="0" cy="0"/>
+        </a:xfrm>
+      </p:grpSpPr>
+      <p:sp>
+        <p:nvSpPr>
+          <p:cNvPr id="2" name="投影片影像版面配置區 1"/>
+          <p:cNvSpPr>
+            <a:spLocks noGrp="1" noRot="1" noChangeAspect="1"/>
+          </p:cNvSpPr>
+          <p:nvPr>
+            <p:ph type="sldImg"/>
+          </p:nvPr>
+        </p:nvSpPr>
+        <p:spPr/>
+      </p:sp>
+      <p:sp>
+        <p:nvSpPr>
+          <p:cNvPr id="3" name="備忘稿版面配置區 2"/>
+          <p:cNvSpPr>
+            <a:spLocks noGrp="1"/>
+          </p:cNvSpPr>
+          <p:nvPr>
+            <p:ph type="body" idx="1"/>
+          </p:nvPr>
+        </p:nvSpPr>
+        <p:spPr/>
+        <p:txBody>
+          <a:bodyPr/>
+          <a:lstStyle/>
+          <a:p>
+            <a:r>
+              <a:rPr lang="zh-TW" altLang="en-US" dirty="0"/>
+              <a:t>第二個驗證是分數階微分的算子，測試了在不同的函數空間上，</a:t>
+            </a:r>
+            <a:r>
+              <a:rPr lang="en-US" altLang="zh-TW" dirty="0" err="1"/>
+              <a:t>DeepONet</a:t>
+            </a:r>
+            <a:r>
+              <a:rPr lang="en-US" altLang="zh-TW" dirty="0"/>
+              <a:t> </a:t>
+            </a:r>
+            <a:r>
+              <a:rPr lang="zh-TW" altLang="en-US" dirty="0"/>
+              <a:t>都有不錯的表現。</a:t>
+            </a:r>
+          </a:p>
+        </p:txBody>
+      </p:sp>
+      <p:sp>
+        <p:nvSpPr>
+          <p:cNvPr id="4" name="投影片編號版面配置區 3"/>
+          <p:cNvSpPr>
+            <a:spLocks noGrp="1"/>
+          </p:cNvSpPr>
+          <p:nvPr>
+            <p:ph type="sldNum" sz="quarter" idx="5"/>
+          </p:nvPr>
+        </p:nvSpPr>
+        <p:spPr/>
+        <p:txBody>
+          <a:bodyPr/>
+          <a:lstStyle/>
+          <a:p>
+            <a:fld id="{53F37B9E-6BA1-42D6-AAD5-58D48F5C5ABC}" type="slidenum">
+              <a:rPr lang="zh-TW" altLang="en-US" smtClean="0"/>
+              <a:t>18</a:t>
+            </a:fld>
+            <a:endParaRPr lang="zh-TW" altLang="en-US"/>
+          </a:p>
+        </p:txBody>
+      </p:sp>
+    </p:spTree>
+    <p:extLst>
+      <p:ext uri="{BB962C8B-B14F-4D97-AF65-F5344CB8AC3E}">
+        <p14:creationId xmlns:p14="http://schemas.microsoft.com/office/powerpoint/2010/main" val="3156916168"/>
+      </p:ext>
+    </p:extLst>
+  </p:cSld>
+  <p:clrMapOvr>
+    <a:masterClrMapping/>
+  </p:clrMapOvr>
+</p:notes>
+</file>
+
+<file path=ppt/notesSlides/notesSlide17.xml><?xml version="1.0" encoding="utf-8"?>
+<p:notes xmlns:a="http://schemas.openxmlformats.org/drawingml/2006/main" xmlns:r="http://schemas.openxmlformats.org/officeDocument/2006/relationships" xmlns:p="http://schemas.openxmlformats.org/presentationml/2006/main">
+  <p:cSld>
+    <p:spTree>
+      <p:nvGrpSpPr>
+        <p:cNvPr id="1" name=""/>
+        <p:cNvGrpSpPr/>
+        <p:nvPr/>
+      </p:nvGrpSpPr>
+      <p:grpSpPr>
+        <a:xfrm>
+          <a:off x="0" y="0"/>
+          <a:ext cx="0" cy="0"/>
+          <a:chOff x="0" y="0"/>
+          <a:chExt cx="0" cy="0"/>
+        </a:xfrm>
+      </p:grpSpPr>
+      <p:sp>
+        <p:nvSpPr>
+          <p:cNvPr id="2" name="投影片影像版面配置區 1"/>
+          <p:cNvSpPr>
+            <a:spLocks noGrp="1" noRot="1" noChangeAspect="1"/>
+          </p:cNvSpPr>
+          <p:nvPr>
+            <p:ph type="sldImg"/>
+          </p:nvPr>
+        </p:nvSpPr>
+        <p:spPr/>
+      </p:sp>
+      <p:sp>
+        <p:nvSpPr>
+          <p:cNvPr id="3" name="備忘稿版面配置區 2"/>
+          <p:cNvSpPr>
+            <a:spLocks noGrp="1"/>
+          </p:cNvSpPr>
+          <p:nvPr>
+            <p:ph type="body" idx="1"/>
+          </p:nvPr>
+        </p:nvSpPr>
+        <p:spPr/>
+        <p:txBody>
+          <a:bodyPr/>
+          <a:lstStyle/>
+          <a:p>
+            <a:r>
+              <a:rPr lang="zh-TW" altLang="en-US" dirty="0"/>
+              <a:t>接下來是應用實驗，像是動力系統（如重力擺）</a:t>
+            </a:r>
+          </a:p>
+        </p:txBody>
+      </p:sp>
+      <p:sp>
+        <p:nvSpPr>
+          <p:cNvPr id="4" name="投影片編號版面配置區 3"/>
+          <p:cNvSpPr>
+            <a:spLocks noGrp="1"/>
+          </p:cNvSpPr>
+          <p:nvPr>
+            <p:ph type="sldNum" sz="quarter" idx="5"/>
+          </p:nvPr>
+        </p:nvSpPr>
+        <p:spPr/>
+        <p:txBody>
+          <a:bodyPr/>
+          <a:lstStyle/>
+          <a:p>
+            <a:fld id="{53F37B9E-6BA1-42D6-AAD5-58D48F5C5ABC}" type="slidenum">
+              <a:rPr lang="zh-TW" altLang="en-US" smtClean="0"/>
+              <a:t>19</a:t>
+            </a:fld>
+            <a:endParaRPr lang="zh-TW" altLang="en-US"/>
+          </a:p>
+        </p:txBody>
+      </p:sp>
+    </p:spTree>
+    <p:extLst>
+      <p:ext uri="{BB962C8B-B14F-4D97-AF65-F5344CB8AC3E}">
+        <p14:creationId xmlns:p14="http://schemas.microsoft.com/office/powerpoint/2010/main" val="2303403818"/>
+      </p:ext>
+    </p:extLst>
+  </p:cSld>
+  <p:clrMapOvr>
+    <a:masterClrMapping/>
+  </p:clrMapOvr>
+</p:notes>
+</file>
+
+<file path=ppt/notesSlides/notesSlide18.xml><?xml version="1.0" encoding="utf-8"?>
+<p:notes xmlns:a="http://schemas.openxmlformats.org/drawingml/2006/main" xmlns:r="http://schemas.openxmlformats.org/officeDocument/2006/relationships" xmlns:p="http://schemas.openxmlformats.org/presentationml/2006/main">
+  <p:cSld>
+    <p:spTree>
+      <p:nvGrpSpPr>
+        <p:cNvPr id="1" name=""/>
+        <p:cNvGrpSpPr/>
+        <p:nvPr/>
+      </p:nvGrpSpPr>
+      <p:grpSpPr>
+        <a:xfrm>
+          <a:off x="0" y="0"/>
+          <a:ext cx="0" cy="0"/>
+          <a:chOff x="0" y="0"/>
+          <a:chExt cx="0" cy="0"/>
+        </a:xfrm>
+      </p:grpSpPr>
+      <p:sp>
+        <p:nvSpPr>
+          <p:cNvPr id="2" name="投影片影像版面配置區 1"/>
+          <p:cNvSpPr>
+            <a:spLocks noGrp="1" noRot="1" noChangeAspect="1"/>
+          </p:cNvSpPr>
+          <p:nvPr>
+            <p:ph type="sldImg"/>
+          </p:nvPr>
+        </p:nvSpPr>
+        <p:spPr/>
+      </p:sp>
+      <p:sp>
+        <p:nvSpPr>
+          <p:cNvPr id="3" name="備忘稿版面配置區 2"/>
+          <p:cNvSpPr>
+            <a:spLocks noGrp="1"/>
+          </p:cNvSpPr>
+          <p:nvPr>
+            <p:ph type="body" idx="1"/>
+          </p:nvPr>
+        </p:nvSpPr>
+        <p:spPr/>
+        <p:txBody>
+          <a:bodyPr/>
+          <a:lstStyle/>
+          <a:p>
+            <a:r>
+              <a:rPr lang="zh-TW" altLang="en-US" dirty="0"/>
+              <a:t>或是隨機微分方程的預測，實驗結果顯示 </a:t>
+            </a:r>
+            <a:r>
+              <a:rPr lang="en-US" altLang="zh-TW" dirty="0" err="1"/>
+              <a:t>DeepONet</a:t>
+            </a:r>
+            <a:r>
+              <a:rPr lang="en-US" altLang="zh-TW" dirty="0"/>
+              <a:t> </a:t>
+            </a:r>
+            <a:r>
+              <a:rPr lang="zh-TW" altLang="en-US" dirty="0"/>
+              <a:t>能準確地模擬這些系統的行為，與真實解幾乎重疊。</a:t>
+            </a:r>
+          </a:p>
+        </p:txBody>
+      </p:sp>
+      <p:sp>
+        <p:nvSpPr>
+          <p:cNvPr id="4" name="投影片編號版面配置區 3"/>
+          <p:cNvSpPr>
+            <a:spLocks noGrp="1"/>
+          </p:cNvSpPr>
+          <p:nvPr>
+            <p:ph type="sldNum" sz="quarter" idx="5"/>
+          </p:nvPr>
+        </p:nvSpPr>
+        <p:spPr/>
+        <p:txBody>
+          <a:bodyPr/>
+          <a:lstStyle/>
+          <a:p>
+            <a:fld id="{53F37B9E-6BA1-42D6-AAD5-58D48F5C5ABC}" type="slidenum">
+              <a:rPr lang="zh-TW" altLang="en-US" smtClean="0"/>
+              <a:t>20</a:t>
+            </a:fld>
+            <a:endParaRPr lang="zh-TW" altLang="en-US"/>
+          </a:p>
+        </p:txBody>
+      </p:sp>
+    </p:spTree>
+    <p:extLst>
+      <p:ext uri="{BB962C8B-B14F-4D97-AF65-F5344CB8AC3E}">
+        <p14:creationId xmlns:p14="http://schemas.microsoft.com/office/powerpoint/2010/main" val="1175526311"/>
+      </p:ext>
+    </p:extLst>
+  </p:cSld>
+  <p:clrMapOvr>
+    <a:masterClrMapping/>
+  </p:clrMapOvr>
+</p:notes>
+</file>
+
+<file path=ppt/notesSlides/notesSlide19.xml><?xml version="1.0" encoding="utf-8"?>
+<p:notes xmlns:a="http://schemas.openxmlformats.org/drawingml/2006/main" xmlns:r="http://schemas.openxmlformats.org/officeDocument/2006/relationships" xmlns:p="http://schemas.openxmlformats.org/presentationml/2006/main">
+  <p:cSld>
+    <p:spTree>
+      <p:nvGrpSpPr>
+        <p:cNvPr id="1" name=""/>
+        <p:cNvGrpSpPr/>
+        <p:nvPr/>
+      </p:nvGrpSpPr>
+      <p:grpSpPr>
+        <a:xfrm>
+          <a:off x="0" y="0"/>
+          <a:ext cx="0" cy="0"/>
+          <a:chOff x="0" y="0"/>
+          <a:chExt cx="0" cy="0"/>
+        </a:xfrm>
+      </p:grpSpPr>
+      <p:sp>
+        <p:nvSpPr>
+          <p:cNvPr id="2" name="投影片影像版面配置區 1"/>
+          <p:cNvSpPr>
+            <a:spLocks noGrp="1" noRot="1" noChangeAspect="1"/>
+          </p:cNvSpPr>
+          <p:nvPr>
+            <p:ph type="sldImg"/>
+          </p:nvPr>
+        </p:nvSpPr>
+        <p:spPr/>
+      </p:sp>
+      <p:sp>
+        <p:nvSpPr>
+          <p:cNvPr id="3" name="備忘稿版面配置區 2"/>
+          <p:cNvSpPr>
+            <a:spLocks noGrp="1"/>
+          </p:cNvSpPr>
+          <p:nvPr>
+            <p:ph type="body" idx="1"/>
+          </p:nvPr>
+        </p:nvSpPr>
+        <p:spPr/>
+        <p:txBody>
+          <a:bodyPr/>
+          <a:lstStyle/>
+          <a:p>
+            <a:r>
+              <a:rPr lang="zh-TW" altLang="en-US" dirty="0"/>
+              <a:t>我們也嘗試了幾個基本的實作來驗證 </a:t>
+            </a:r>
+            <a:r>
+              <a:rPr lang="en-US" altLang="zh-TW" dirty="0" err="1"/>
+              <a:t>DeepONet</a:t>
+            </a:r>
+            <a:r>
+              <a:rPr lang="en-US" altLang="zh-TW" dirty="0"/>
+              <a:t> </a:t>
+            </a:r>
+            <a:r>
+              <a:rPr lang="zh-TW" altLang="en-US" dirty="0"/>
+              <a:t>的能力，像是學習：正弦函數的微分</a:t>
+            </a:r>
+          </a:p>
+        </p:txBody>
+      </p:sp>
+      <p:sp>
+        <p:nvSpPr>
+          <p:cNvPr id="4" name="投影片編號版面配置區 3"/>
+          <p:cNvSpPr>
+            <a:spLocks noGrp="1"/>
+          </p:cNvSpPr>
+          <p:nvPr>
+            <p:ph type="sldNum" sz="quarter" idx="5"/>
+          </p:nvPr>
+        </p:nvSpPr>
+        <p:spPr/>
+        <p:txBody>
+          <a:bodyPr/>
+          <a:lstStyle/>
+          <a:p>
+            <a:fld id="{53F37B9E-6BA1-42D6-AAD5-58D48F5C5ABC}" type="slidenum">
+              <a:rPr lang="zh-TW" altLang="en-US" smtClean="0"/>
+              <a:t>21</a:t>
+            </a:fld>
+            <a:endParaRPr lang="zh-TW" altLang="en-US"/>
+          </a:p>
+        </p:txBody>
+      </p:sp>
+    </p:spTree>
+    <p:extLst>
+      <p:ext uri="{BB962C8B-B14F-4D97-AF65-F5344CB8AC3E}">
+        <p14:creationId xmlns:p14="http://schemas.microsoft.com/office/powerpoint/2010/main" val="1071390834"/>
+      </p:ext>
+    </p:extLst>
+  </p:cSld>
+  <p:clrMapOvr>
+    <a:masterClrMapping/>
+  </p:clrMapOvr>
+</p:notes>
+</file>
+
+<file path=ppt/notesSlides/notesSlide2.xml><?xml version="1.0" encoding="utf-8"?>
+<p:notes xmlns:a="http://schemas.openxmlformats.org/drawingml/2006/main" xmlns:r="http://schemas.openxmlformats.org/officeDocument/2006/relationships" xmlns:p="http://schemas.openxmlformats.org/presentationml/2006/main">
+  <p:cSld>
+    <p:spTree>
+      <p:nvGrpSpPr>
+        <p:cNvPr id="1" name=""/>
+        <p:cNvGrpSpPr/>
+        <p:nvPr/>
+      </p:nvGrpSpPr>
+      <p:grpSpPr>
+        <a:xfrm>
+          <a:off x="0" y="0"/>
+          <a:ext cx="0" cy="0"/>
+          <a:chOff x="0" y="0"/>
+          <a:chExt cx="0" cy="0"/>
+        </a:xfrm>
+      </p:grpSpPr>
+      <p:sp>
+        <p:nvSpPr>
+          <p:cNvPr id="2" name="投影片影像版面配置區 1"/>
+          <p:cNvSpPr>
+            <a:spLocks noGrp="1" noRot="1" noChangeAspect="1"/>
+          </p:cNvSpPr>
+          <p:nvPr>
+            <p:ph type="sldImg"/>
+          </p:nvPr>
+        </p:nvSpPr>
+        <p:spPr/>
+      </p:sp>
+      <p:sp>
+        <p:nvSpPr>
+          <p:cNvPr id="3" name="備忘稿版面配置區 2"/>
+          <p:cNvSpPr>
+            <a:spLocks noGrp="1"/>
+          </p:cNvSpPr>
+          <p:nvPr>
+            <p:ph type="body" idx="1"/>
+          </p:nvPr>
+        </p:nvSpPr>
+        <p:spPr/>
+        <p:txBody>
+          <a:bodyPr/>
+          <a:lstStyle/>
+          <a:p>
+            <a:r>
+              <a:rPr lang="zh-TW" altLang="en-US" dirty="0"/>
+              <a:t>接下來的報告大綱包括：研究背景與問題、什麼是算子、</a:t>
+            </a:r>
+            <a:r>
+              <a:rPr lang="en-US" altLang="zh-TW" dirty="0" err="1"/>
+              <a:t>DeepONet</a:t>
+            </a:r>
+            <a:r>
+              <a:rPr lang="en-US" altLang="zh-TW" dirty="0"/>
+              <a:t> </a:t>
+            </a:r>
+            <a:r>
+              <a:rPr lang="zh-TW" altLang="en-US" dirty="0"/>
+              <a:t>的架構、通用近似定理、訓練數據來源、驗證與應用實驗，以及我們的實作與總結。</a:t>
+            </a:r>
+          </a:p>
+        </p:txBody>
+      </p:sp>
+      <p:sp>
+        <p:nvSpPr>
+          <p:cNvPr id="4" name="投影片編號版面配置區 3"/>
+          <p:cNvSpPr>
+            <a:spLocks noGrp="1"/>
+          </p:cNvSpPr>
+          <p:nvPr>
+            <p:ph type="sldNum" sz="quarter" idx="5"/>
+          </p:nvPr>
+        </p:nvSpPr>
+        <p:spPr/>
+        <p:txBody>
+          <a:bodyPr/>
+          <a:lstStyle/>
+          <a:p>
+            <a:fld id="{53F37B9E-6BA1-42D6-AAD5-58D48F5C5ABC}" type="slidenum">
+              <a:rPr lang="zh-TW" altLang="en-US" smtClean="0"/>
+              <a:t>2</a:t>
+            </a:fld>
+            <a:endParaRPr lang="zh-TW" altLang="en-US"/>
+          </a:p>
+        </p:txBody>
+      </p:sp>
+    </p:spTree>
+    <p:extLst>
+      <p:ext uri="{BB962C8B-B14F-4D97-AF65-F5344CB8AC3E}">
+        <p14:creationId xmlns:p14="http://schemas.microsoft.com/office/powerpoint/2010/main" val="83698626"/>
+      </p:ext>
+    </p:extLst>
+  </p:cSld>
+  <p:clrMapOvr>
+    <a:masterClrMapping/>
+  </p:clrMapOvr>
+</p:notes>
+</file>
+
+<file path=ppt/notesSlides/notesSlide20.xml><?xml version="1.0" encoding="utf-8"?>
+<p:notes xmlns:a="http://schemas.openxmlformats.org/drawingml/2006/main" xmlns:r="http://schemas.openxmlformats.org/officeDocument/2006/relationships" xmlns:p="http://schemas.openxmlformats.org/presentationml/2006/main">
+  <p:cSld>
+    <p:spTree>
+      <p:nvGrpSpPr>
+        <p:cNvPr id="1" name=""/>
+        <p:cNvGrpSpPr/>
+        <p:nvPr/>
+      </p:nvGrpSpPr>
+      <p:grpSpPr>
+        <a:xfrm>
+          <a:off x="0" y="0"/>
+          <a:ext cx="0" cy="0"/>
+          <a:chOff x="0" y="0"/>
+          <a:chExt cx="0" cy="0"/>
+        </a:xfrm>
+      </p:grpSpPr>
+      <p:sp>
+        <p:nvSpPr>
+          <p:cNvPr id="2" name="投影片影像版面配置區 1"/>
+          <p:cNvSpPr>
+            <a:spLocks noGrp="1" noRot="1" noChangeAspect="1"/>
+          </p:cNvSpPr>
+          <p:nvPr>
+            <p:ph type="sldImg"/>
+          </p:nvPr>
+        </p:nvSpPr>
+        <p:spPr/>
+      </p:sp>
+      <p:sp>
+        <p:nvSpPr>
+          <p:cNvPr id="3" name="備忘稿版面配置區 2"/>
+          <p:cNvSpPr>
+            <a:spLocks noGrp="1"/>
+          </p:cNvSpPr>
+          <p:nvPr>
+            <p:ph type="body" idx="1"/>
+          </p:nvPr>
+        </p:nvSpPr>
+        <p:spPr/>
+        <p:txBody>
+          <a:bodyPr/>
+          <a:lstStyle/>
+          <a:p>
+            <a:r>
+              <a:rPr lang="zh-TW" altLang="en-US" dirty="0"/>
+              <a:t>正弦函數的積分</a:t>
+            </a:r>
+          </a:p>
+        </p:txBody>
+      </p:sp>
+      <p:sp>
+        <p:nvSpPr>
+          <p:cNvPr id="4" name="投影片編號版面配置區 3"/>
+          <p:cNvSpPr>
+            <a:spLocks noGrp="1"/>
+          </p:cNvSpPr>
+          <p:nvPr>
+            <p:ph type="sldNum" sz="quarter" idx="5"/>
+          </p:nvPr>
+        </p:nvSpPr>
+        <p:spPr/>
+        <p:txBody>
+          <a:bodyPr/>
+          <a:lstStyle/>
+          <a:p>
+            <a:fld id="{53F37B9E-6BA1-42D6-AAD5-58D48F5C5ABC}" type="slidenum">
+              <a:rPr lang="zh-TW" altLang="en-US" smtClean="0"/>
+              <a:t>22</a:t>
+            </a:fld>
+            <a:endParaRPr lang="zh-TW" altLang="en-US"/>
+          </a:p>
+        </p:txBody>
+      </p:sp>
+    </p:spTree>
+    <p:extLst>
+      <p:ext uri="{BB962C8B-B14F-4D97-AF65-F5344CB8AC3E}">
+        <p14:creationId xmlns:p14="http://schemas.microsoft.com/office/powerpoint/2010/main" val="14524508"/>
+      </p:ext>
+    </p:extLst>
+  </p:cSld>
+  <p:clrMapOvr>
+    <a:masterClrMapping/>
+  </p:clrMapOvr>
+</p:notes>
+</file>
+
+<file path=ppt/notesSlides/notesSlide21.xml><?xml version="1.0" encoding="utf-8"?>
+<p:notes xmlns:a="http://schemas.openxmlformats.org/drawingml/2006/main" xmlns:r="http://schemas.openxmlformats.org/officeDocument/2006/relationships" xmlns:p="http://schemas.openxmlformats.org/presentationml/2006/main">
+  <p:cSld>
+    <p:spTree>
+      <p:nvGrpSpPr>
+        <p:cNvPr id="1" name=""/>
+        <p:cNvGrpSpPr/>
+        <p:nvPr/>
+      </p:nvGrpSpPr>
+      <p:grpSpPr>
+        <a:xfrm>
+          <a:off x="0" y="0"/>
+          <a:ext cx="0" cy="0"/>
+          <a:chOff x="0" y="0"/>
+          <a:chExt cx="0" cy="0"/>
+        </a:xfrm>
+      </p:grpSpPr>
+      <p:sp>
+        <p:nvSpPr>
+          <p:cNvPr id="2" name="投影片影像版面配置區 1"/>
+          <p:cNvSpPr>
+            <a:spLocks noGrp="1" noRot="1" noChangeAspect="1"/>
+          </p:cNvSpPr>
+          <p:nvPr>
+            <p:ph type="sldImg"/>
+          </p:nvPr>
+        </p:nvSpPr>
+        <p:spPr/>
+      </p:sp>
+      <p:sp>
+        <p:nvSpPr>
+          <p:cNvPr id="3" name="備忘稿版面配置區 2"/>
+          <p:cNvSpPr>
+            <a:spLocks noGrp="1"/>
+          </p:cNvSpPr>
+          <p:nvPr>
+            <p:ph type="body" idx="1"/>
+          </p:nvPr>
+        </p:nvSpPr>
+        <p:spPr/>
+        <p:txBody>
+          <a:bodyPr/>
+          <a:lstStyle/>
+          <a:p>
+            <a:r>
+              <a:rPr lang="en-US" altLang="zh-TW" dirty="0"/>
+              <a:t>Sigmoid </a:t>
+            </a:r>
+            <a:r>
+              <a:rPr lang="zh-TW" altLang="en-US" dirty="0"/>
+              <a:t>的微分</a:t>
+            </a:r>
+          </a:p>
+        </p:txBody>
+      </p:sp>
+      <p:sp>
+        <p:nvSpPr>
+          <p:cNvPr id="4" name="投影片編號版面配置區 3"/>
+          <p:cNvSpPr>
+            <a:spLocks noGrp="1"/>
+          </p:cNvSpPr>
+          <p:nvPr>
+            <p:ph type="sldNum" sz="quarter" idx="5"/>
+          </p:nvPr>
+        </p:nvSpPr>
+        <p:spPr/>
+        <p:txBody>
+          <a:bodyPr/>
+          <a:lstStyle/>
+          <a:p>
+            <a:fld id="{53F37B9E-6BA1-42D6-AAD5-58D48F5C5ABC}" type="slidenum">
+              <a:rPr lang="zh-TW" altLang="en-US" smtClean="0"/>
+              <a:t>23</a:t>
+            </a:fld>
+            <a:endParaRPr lang="zh-TW" altLang="en-US"/>
+          </a:p>
+        </p:txBody>
+      </p:sp>
+    </p:spTree>
+    <p:extLst>
+      <p:ext uri="{BB962C8B-B14F-4D97-AF65-F5344CB8AC3E}">
+        <p14:creationId xmlns:p14="http://schemas.microsoft.com/office/powerpoint/2010/main" val="1340046652"/>
+      </p:ext>
+    </p:extLst>
+  </p:cSld>
+  <p:clrMapOvr>
+    <a:masterClrMapping/>
+  </p:clrMapOvr>
+</p:notes>
+</file>
+
+<file path=ppt/notesSlides/notesSlide22.xml><?xml version="1.0" encoding="utf-8"?>
+<p:notes xmlns:a="http://schemas.openxmlformats.org/drawingml/2006/main" xmlns:r="http://schemas.openxmlformats.org/officeDocument/2006/relationships" xmlns:p="http://schemas.openxmlformats.org/presentationml/2006/main">
+  <p:cSld>
+    <p:spTree>
+      <p:nvGrpSpPr>
+        <p:cNvPr id="1" name=""/>
+        <p:cNvGrpSpPr/>
+        <p:nvPr/>
+      </p:nvGrpSpPr>
+      <p:grpSpPr>
+        <a:xfrm>
+          <a:off x="0" y="0"/>
+          <a:ext cx="0" cy="0"/>
+          <a:chOff x="0" y="0"/>
+          <a:chExt cx="0" cy="0"/>
+        </a:xfrm>
+      </p:grpSpPr>
+      <p:sp>
+        <p:nvSpPr>
+          <p:cNvPr id="2" name="投影片影像版面配置區 1"/>
+          <p:cNvSpPr>
+            <a:spLocks noGrp="1" noRot="1" noChangeAspect="1"/>
+          </p:cNvSpPr>
+          <p:nvPr>
+            <p:ph type="sldImg"/>
+          </p:nvPr>
+        </p:nvSpPr>
+        <p:spPr/>
+      </p:sp>
+      <p:sp>
+        <p:nvSpPr>
+          <p:cNvPr id="3" name="備忘稿版面配置區 2"/>
+          <p:cNvSpPr>
+            <a:spLocks noGrp="1"/>
+          </p:cNvSpPr>
+          <p:nvPr>
+            <p:ph type="body" idx="1"/>
+          </p:nvPr>
+        </p:nvSpPr>
+        <p:spPr/>
+        <p:txBody>
+          <a:bodyPr/>
+          <a:lstStyle/>
+          <a:p>
+            <a:r>
+              <a:rPr lang="zh-TW" altLang="en-US" dirty="0"/>
+              <a:t>指數函數的組合算子</a:t>
+            </a:r>
+          </a:p>
+        </p:txBody>
+      </p:sp>
+      <p:sp>
+        <p:nvSpPr>
+          <p:cNvPr id="4" name="投影片編號版面配置區 3"/>
+          <p:cNvSpPr>
+            <a:spLocks noGrp="1"/>
+          </p:cNvSpPr>
+          <p:nvPr>
+            <p:ph type="sldNum" sz="quarter" idx="5"/>
+          </p:nvPr>
+        </p:nvSpPr>
+        <p:spPr/>
+        <p:txBody>
+          <a:bodyPr/>
+          <a:lstStyle/>
+          <a:p>
+            <a:fld id="{53F37B9E-6BA1-42D6-AAD5-58D48F5C5ABC}" type="slidenum">
+              <a:rPr lang="zh-TW" altLang="en-US" smtClean="0"/>
+              <a:t>24</a:t>
+            </a:fld>
+            <a:endParaRPr lang="zh-TW" altLang="en-US"/>
+          </a:p>
+        </p:txBody>
+      </p:sp>
+    </p:spTree>
+    <p:extLst>
+      <p:ext uri="{BB962C8B-B14F-4D97-AF65-F5344CB8AC3E}">
+        <p14:creationId xmlns:p14="http://schemas.microsoft.com/office/powerpoint/2010/main" val="1816180778"/>
+      </p:ext>
+    </p:extLst>
+  </p:cSld>
+  <p:clrMapOvr>
+    <a:masterClrMapping/>
+  </p:clrMapOvr>
+</p:notes>
+</file>
+
+<file path=ppt/notesSlides/notesSlide23.xml><?xml version="1.0" encoding="utf-8"?>
+<p:notes xmlns:a="http://schemas.openxmlformats.org/drawingml/2006/main" xmlns:r="http://schemas.openxmlformats.org/officeDocument/2006/relationships" xmlns:p="http://schemas.openxmlformats.org/presentationml/2006/main">
+  <p:cSld>
+    <p:spTree>
+      <p:nvGrpSpPr>
+        <p:cNvPr id="1" name=""/>
+        <p:cNvGrpSpPr/>
+        <p:nvPr/>
+      </p:nvGrpSpPr>
+      <p:grpSpPr>
+        <a:xfrm>
+          <a:off x="0" y="0"/>
+          <a:ext cx="0" cy="0"/>
+          <a:chOff x="0" y="0"/>
+          <a:chExt cx="0" cy="0"/>
+        </a:xfrm>
+      </p:grpSpPr>
+      <p:sp>
+        <p:nvSpPr>
+          <p:cNvPr id="2" name="投影片影像版面配置區 1"/>
+          <p:cNvSpPr>
+            <a:spLocks noGrp="1" noRot="1" noChangeAspect="1"/>
+          </p:cNvSpPr>
+          <p:nvPr>
+            <p:ph type="sldImg"/>
+          </p:nvPr>
+        </p:nvSpPr>
+        <p:spPr/>
+      </p:sp>
+      <p:sp>
+        <p:nvSpPr>
+          <p:cNvPr id="3" name="備忘稿版面配置區 2"/>
+          <p:cNvSpPr>
+            <a:spLocks noGrp="1"/>
+          </p:cNvSpPr>
+          <p:nvPr>
+            <p:ph type="body" idx="1"/>
+          </p:nvPr>
+        </p:nvSpPr>
+        <p:spPr/>
+        <p:txBody>
+          <a:bodyPr/>
+          <a:lstStyle/>
+          <a:p>
+            <a:r>
+              <a:rPr lang="zh-TW" altLang="en-US" dirty="0"/>
+              <a:t>總結來說，</a:t>
+            </a:r>
+            <a:r>
+              <a:rPr lang="en-US" altLang="zh-TW" dirty="0" err="1"/>
+              <a:t>DeepONet</a:t>
+            </a:r>
+            <a:r>
+              <a:rPr lang="en-US" altLang="zh-TW" dirty="0"/>
+              <a:t> </a:t>
+            </a:r>
+            <a:r>
+              <a:rPr lang="zh-TW" altLang="en-US" dirty="0"/>
+              <a:t>的價值在於可以學習整個函數映射的類型，一旦訓練完成，就能解決整個問題族群，像是所有的熱傳導 </a:t>
+            </a:r>
+            <a:r>
+              <a:rPr lang="en-US" altLang="zh-TW" dirty="0"/>
+              <a:t>PDE</a:t>
+            </a:r>
+            <a:r>
+              <a:rPr lang="zh-TW" altLang="en-US" dirty="0"/>
+              <a:t>。而在這之後，</a:t>
+            </a:r>
+            <a:r>
+              <a:rPr lang="en-US" altLang="zh-TW" dirty="0"/>
+              <a:t>Fourier Neural Operator </a:t>
+            </a:r>
+            <a:r>
+              <a:rPr lang="zh-TW" altLang="en-US" dirty="0"/>
+              <a:t>進一步推升了這個領域，而 </a:t>
+            </a:r>
+            <a:r>
+              <a:rPr lang="en-US" altLang="zh-TW" dirty="0" err="1"/>
+              <a:t>nVIDIA</a:t>
+            </a:r>
+            <a:r>
+              <a:rPr lang="en-US" altLang="zh-TW" dirty="0"/>
+              <a:t> </a:t>
+            </a:r>
+            <a:r>
+              <a:rPr lang="zh-TW" altLang="en-US" dirty="0"/>
+              <a:t>開發的 </a:t>
+            </a:r>
+            <a:r>
+              <a:rPr lang="en-US" altLang="zh-TW" dirty="0" err="1"/>
+              <a:t>FourCastNet</a:t>
+            </a:r>
+            <a:r>
+              <a:rPr lang="en-US" altLang="zh-TW" dirty="0"/>
+              <a:t> </a:t>
+            </a:r>
+            <a:r>
+              <a:rPr lang="zh-TW" altLang="en-US" dirty="0"/>
+              <a:t>更是把算子學習帶入真實應用。</a:t>
+            </a:r>
+          </a:p>
+        </p:txBody>
+      </p:sp>
+      <p:sp>
+        <p:nvSpPr>
+          <p:cNvPr id="4" name="投影片編號版面配置區 3"/>
+          <p:cNvSpPr>
+            <a:spLocks noGrp="1"/>
+          </p:cNvSpPr>
+          <p:nvPr>
+            <p:ph type="sldNum" sz="quarter" idx="5"/>
+          </p:nvPr>
+        </p:nvSpPr>
+        <p:spPr/>
+        <p:txBody>
+          <a:bodyPr/>
+          <a:lstStyle/>
+          <a:p>
+            <a:fld id="{53F37B9E-6BA1-42D6-AAD5-58D48F5C5ABC}" type="slidenum">
+              <a:rPr lang="zh-TW" altLang="en-US" smtClean="0"/>
+              <a:t>25</a:t>
+            </a:fld>
+            <a:endParaRPr lang="zh-TW" altLang="en-US"/>
+          </a:p>
+        </p:txBody>
+      </p:sp>
+    </p:spTree>
+    <p:extLst>
+      <p:ext uri="{BB962C8B-B14F-4D97-AF65-F5344CB8AC3E}">
+        <p14:creationId xmlns:p14="http://schemas.microsoft.com/office/powerpoint/2010/main" val="1528007542"/>
+      </p:ext>
+    </p:extLst>
+  </p:cSld>
+  <p:clrMapOvr>
+    <a:masterClrMapping/>
+  </p:clrMapOvr>
+</p:notes>
+</file>
+
+<file path=ppt/notesSlides/notesSlide24.xml><?xml version="1.0" encoding="utf-8"?>
+<p:notes xmlns:a="http://schemas.openxmlformats.org/drawingml/2006/main" xmlns:r="http://schemas.openxmlformats.org/officeDocument/2006/relationships" xmlns:p="http://schemas.openxmlformats.org/presentationml/2006/main">
+  <p:cSld>
+    <p:spTree>
+      <p:nvGrpSpPr>
+        <p:cNvPr id="1" name=""/>
+        <p:cNvGrpSpPr/>
+        <p:nvPr/>
+      </p:nvGrpSpPr>
+      <p:grpSpPr>
+        <a:xfrm>
+          <a:off x="0" y="0"/>
+          <a:ext cx="0" cy="0"/>
+          <a:chOff x="0" y="0"/>
+          <a:chExt cx="0" cy="0"/>
+        </a:xfrm>
+      </p:grpSpPr>
+      <p:sp>
+        <p:nvSpPr>
+          <p:cNvPr id="2" name="投影片影像版面配置區 1"/>
+          <p:cNvSpPr>
+            <a:spLocks noGrp="1" noRot="1" noChangeAspect="1"/>
+          </p:cNvSpPr>
+          <p:nvPr>
+            <p:ph type="sldImg"/>
+          </p:nvPr>
+        </p:nvSpPr>
+        <p:spPr/>
+      </p:sp>
+      <p:sp>
+        <p:nvSpPr>
+          <p:cNvPr id="3" name="備忘稿版面配置區 2"/>
+          <p:cNvSpPr>
+            <a:spLocks noGrp="1"/>
+          </p:cNvSpPr>
+          <p:nvPr>
+            <p:ph type="body" idx="1"/>
+          </p:nvPr>
+        </p:nvSpPr>
+        <p:spPr/>
+        <p:txBody>
+          <a:bodyPr/>
+          <a:lstStyle/>
+          <a:p>
+            <a:r>
+              <a:rPr lang="zh-TW" altLang="en-US" dirty="0"/>
+              <a:t>這是 </a:t>
+            </a:r>
+            <a:r>
+              <a:rPr lang="en-US" altLang="zh-TW" dirty="0" err="1"/>
+              <a:t>FourCastNet</a:t>
+            </a:r>
+            <a:r>
+              <a:rPr lang="en-US" altLang="zh-TW" dirty="0"/>
+              <a:t> </a:t>
+            </a:r>
+            <a:r>
+              <a:rPr lang="zh-TW" altLang="en-US" dirty="0"/>
+              <a:t>的實際案例，它使用了 </a:t>
+            </a:r>
+            <a:r>
+              <a:rPr lang="en-US" altLang="zh-TW" dirty="0"/>
+              <a:t>FNO </a:t>
+            </a:r>
+            <a:r>
+              <a:rPr lang="zh-TW" altLang="en-US" dirty="0"/>
+              <a:t>架構來預測天氣，是目前少數真正應用在產業的算子學習成果之一。</a:t>
+            </a:r>
+          </a:p>
+        </p:txBody>
+      </p:sp>
+      <p:sp>
+        <p:nvSpPr>
+          <p:cNvPr id="4" name="投影片編號版面配置區 3"/>
+          <p:cNvSpPr>
+            <a:spLocks noGrp="1"/>
+          </p:cNvSpPr>
+          <p:nvPr>
+            <p:ph type="sldNum" sz="quarter" idx="5"/>
+          </p:nvPr>
+        </p:nvSpPr>
+        <p:spPr/>
+        <p:txBody>
+          <a:bodyPr/>
+          <a:lstStyle/>
+          <a:p>
+            <a:fld id="{53F37B9E-6BA1-42D6-AAD5-58D48F5C5ABC}" type="slidenum">
+              <a:rPr lang="zh-TW" altLang="en-US" smtClean="0"/>
+              <a:t>26</a:t>
+            </a:fld>
+            <a:endParaRPr lang="zh-TW" altLang="en-US"/>
+          </a:p>
+        </p:txBody>
+      </p:sp>
+    </p:spTree>
+    <p:extLst>
+      <p:ext uri="{BB962C8B-B14F-4D97-AF65-F5344CB8AC3E}">
+        <p14:creationId xmlns:p14="http://schemas.microsoft.com/office/powerpoint/2010/main" val="1460022035"/>
+      </p:ext>
+    </p:extLst>
+  </p:cSld>
+  <p:clrMapOvr>
+    <a:masterClrMapping/>
+  </p:clrMapOvr>
+</p:notes>
+</file>
+
+<file path=ppt/notesSlides/notesSlide25.xml><?xml version="1.0" encoding="utf-8"?>
+<p:notes xmlns:a="http://schemas.openxmlformats.org/drawingml/2006/main" xmlns:r="http://schemas.openxmlformats.org/officeDocument/2006/relationships" xmlns:p="http://schemas.openxmlformats.org/presentationml/2006/main">
+  <p:cSld>
+    <p:spTree>
+      <p:nvGrpSpPr>
+        <p:cNvPr id="1" name=""/>
+        <p:cNvGrpSpPr/>
+        <p:nvPr/>
+      </p:nvGrpSpPr>
+      <p:grpSpPr>
+        <a:xfrm>
+          <a:off x="0" y="0"/>
+          <a:ext cx="0" cy="0"/>
+          <a:chOff x="0" y="0"/>
+          <a:chExt cx="0" cy="0"/>
+        </a:xfrm>
+      </p:grpSpPr>
+      <p:sp>
+        <p:nvSpPr>
+          <p:cNvPr id="2" name="投影片影像版面配置區 1"/>
+          <p:cNvSpPr>
+            <a:spLocks noGrp="1" noRot="1" noChangeAspect="1"/>
+          </p:cNvSpPr>
+          <p:nvPr>
+            <p:ph type="sldImg"/>
+          </p:nvPr>
+        </p:nvSpPr>
+        <p:spPr/>
+      </p:sp>
+      <p:sp>
+        <p:nvSpPr>
+          <p:cNvPr id="3" name="備忘稿版面配置區 2"/>
+          <p:cNvSpPr>
+            <a:spLocks noGrp="1"/>
+          </p:cNvSpPr>
+          <p:nvPr>
+            <p:ph type="body" idx="1"/>
+          </p:nvPr>
+        </p:nvSpPr>
+        <p:spPr/>
+        <p:txBody>
+          <a:bodyPr/>
+          <a:lstStyle/>
+          <a:p>
+            <a:r>
+              <a:rPr lang="zh-TW" altLang="en-US" dirty="0"/>
+              <a:t>我們這次報告主要參考了論文原文與幾篇深入解釋 </a:t>
+            </a:r>
+            <a:r>
+              <a:rPr lang="en-US" altLang="zh-TW" dirty="0" err="1"/>
+              <a:t>DeepONet</a:t>
+            </a:r>
+            <a:r>
+              <a:rPr lang="en-US" altLang="zh-TW" dirty="0"/>
+              <a:t> </a:t>
+            </a:r>
+            <a:r>
+              <a:rPr lang="zh-TW" altLang="en-US" dirty="0"/>
+              <a:t>的文章，有興趣的同學也可以再深入閱讀。</a:t>
+            </a:r>
+          </a:p>
+        </p:txBody>
+      </p:sp>
+      <p:sp>
+        <p:nvSpPr>
+          <p:cNvPr id="4" name="投影片編號版面配置區 3"/>
+          <p:cNvSpPr>
+            <a:spLocks noGrp="1"/>
+          </p:cNvSpPr>
+          <p:nvPr>
+            <p:ph type="sldNum" sz="quarter" idx="5"/>
+          </p:nvPr>
+        </p:nvSpPr>
+        <p:spPr/>
+        <p:txBody>
+          <a:bodyPr/>
+          <a:lstStyle/>
+          <a:p>
+            <a:fld id="{53F37B9E-6BA1-42D6-AAD5-58D48F5C5ABC}" type="slidenum">
+              <a:rPr lang="zh-TW" altLang="en-US" smtClean="0"/>
+              <a:t>28</a:t>
+            </a:fld>
+            <a:endParaRPr lang="zh-TW" altLang="en-US"/>
+          </a:p>
+        </p:txBody>
+      </p:sp>
+    </p:spTree>
+    <p:extLst>
+      <p:ext uri="{BB962C8B-B14F-4D97-AF65-F5344CB8AC3E}">
+        <p14:creationId xmlns:p14="http://schemas.microsoft.com/office/powerpoint/2010/main" val="2110887726"/>
+      </p:ext>
+    </p:extLst>
+  </p:cSld>
+  <p:clrMapOvr>
+    <a:masterClrMapping/>
+  </p:clrMapOvr>
+</p:notes>
+</file>
+
+<file path=ppt/notesSlides/notesSlide26.xml><?xml version="1.0" encoding="utf-8"?>
+<p:notes xmlns:a="http://schemas.openxmlformats.org/drawingml/2006/main" xmlns:r="http://schemas.openxmlformats.org/officeDocument/2006/relationships" xmlns:p="http://schemas.openxmlformats.org/presentationml/2006/main">
+  <p:cSld>
+    <p:spTree>
+      <p:nvGrpSpPr>
+        <p:cNvPr id="1" name=""/>
+        <p:cNvGrpSpPr/>
+        <p:nvPr/>
+      </p:nvGrpSpPr>
+      <p:grpSpPr>
+        <a:xfrm>
+          <a:off x="0" y="0"/>
+          <a:ext cx="0" cy="0"/>
+          <a:chOff x="0" y="0"/>
+          <a:chExt cx="0" cy="0"/>
+        </a:xfrm>
+      </p:grpSpPr>
+      <p:sp>
+        <p:nvSpPr>
+          <p:cNvPr id="2" name="投影片影像版面配置區 1"/>
+          <p:cNvSpPr>
+            <a:spLocks noGrp="1" noRot="1" noChangeAspect="1"/>
+          </p:cNvSpPr>
+          <p:nvPr>
+            <p:ph type="sldImg"/>
+          </p:nvPr>
+        </p:nvSpPr>
+        <p:spPr/>
+      </p:sp>
+      <p:sp>
+        <p:nvSpPr>
+          <p:cNvPr id="3" name="備忘稿版面配置區 2"/>
+          <p:cNvSpPr>
+            <a:spLocks noGrp="1"/>
+          </p:cNvSpPr>
+          <p:nvPr>
+            <p:ph type="body" idx="1"/>
+          </p:nvPr>
+        </p:nvSpPr>
+        <p:spPr/>
+        <p:txBody>
+          <a:bodyPr/>
+          <a:lstStyle/>
+          <a:p>
+            <a:r>
+              <a:rPr lang="zh-TW" altLang="en-US" dirty="0"/>
+              <a:t>以上是我們的報告內容，謝謝大家的聆聽。接下來歡迎大家提問，我們會盡力回答。</a:t>
+            </a:r>
+          </a:p>
+        </p:txBody>
+      </p:sp>
+      <p:sp>
+        <p:nvSpPr>
+          <p:cNvPr id="4" name="投影片編號版面配置區 3"/>
+          <p:cNvSpPr>
+            <a:spLocks noGrp="1"/>
+          </p:cNvSpPr>
+          <p:nvPr>
+            <p:ph type="sldNum" sz="quarter" idx="5"/>
+          </p:nvPr>
+        </p:nvSpPr>
+        <p:spPr/>
+        <p:txBody>
+          <a:bodyPr/>
+          <a:lstStyle/>
+          <a:p>
+            <a:fld id="{53F37B9E-6BA1-42D6-AAD5-58D48F5C5ABC}" type="slidenum">
+              <a:rPr lang="zh-TW" altLang="en-US" smtClean="0"/>
+              <a:t>29</a:t>
+            </a:fld>
+            <a:endParaRPr lang="zh-TW" altLang="en-US"/>
+          </a:p>
+        </p:txBody>
+      </p:sp>
+    </p:spTree>
+    <p:extLst>
+      <p:ext uri="{BB962C8B-B14F-4D97-AF65-F5344CB8AC3E}">
+        <p14:creationId xmlns:p14="http://schemas.microsoft.com/office/powerpoint/2010/main" val="18702716"/>
+      </p:ext>
+    </p:extLst>
+  </p:cSld>
+  <p:clrMapOvr>
+    <a:masterClrMapping/>
+  </p:clrMapOvr>
+</p:notes>
+</file>
+
+<file path=ppt/notesSlides/notesSlide3.xml><?xml version="1.0" encoding="utf-8"?>
+<p:notes xmlns:a="http://schemas.openxmlformats.org/drawingml/2006/main" xmlns:r="http://schemas.openxmlformats.org/officeDocument/2006/relationships" xmlns:p="http://schemas.openxmlformats.org/presentationml/2006/main">
+  <p:cSld>
+    <p:spTree>
+      <p:nvGrpSpPr>
+        <p:cNvPr id="1" name=""/>
+        <p:cNvGrpSpPr/>
+        <p:nvPr/>
+      </p:nvGrpSpPr>
+      <p:grpSpPr>
+        <a:xfrm>
+          <a:off x="0" y="0"/>
+          <a:ext cx="0" cy="0"/>
+          <a:chOff x="0" y="0"/>
+          <a:chExt cx="0" cy="0"/>
+        </a:xfrm>
+      </p:grpSpPr>
+      <p:sp>
+        <p:nvSpPr>
+          <p:cNvPr id="2" name="投影片影像版面配置區 1"/>
+          <p:cNvSpPr>
+            <a:spLocks noGrp="1" noRot="1" noChangeAspect="1"/>
+          </p:cNvSpPr>
+          <p:nvPr>
+            <p:ph type="sldImg"/>
+          </p:nvPr>
+        </p:nvSpPr>
+        <p:spPr/>
+      </p:sp>
+      <p:sp>
+        <p:nvSpPr>
+          <p:cNvPr id="3" name="備忘稿版面配置區 2"/>
+          <p:cNvSpPr>
+            <a:spLocks noGrp="1"/>
+          </p:cNvSpPr>
+          <p:nvPr>
+            <p:ph type="body" idx="1"/>
+          </p:nvPr>
+        </p:nvSpPr>
+        <p:spPr/>
+        <p:txBody>
+          <a:bodyPr/>
+          <a:lstStyle/>
+          <a:p>
+            <a:r>
+              <a:rPr lang="zh-TW" altLang="en-US" dirty="0"/>
+              <a:t>傳統神經網路通常是處理從輸入到輸出點的對應關係，也就是 </a:t>
+            </a:r>
+            <a:r>
+              <a:rPr lang="en-US" altLang="zh-TW" dirty="0"/>
+              <a:t>x </a:t>
+            </a:r>
+            <a:r>
+              <a:rPr lang="zh-TW" altLang="en-US" dirty="0"/>
+              <a:t>對應到 </a:t>
+            </a:r>
+            <a:r>
+              <a:rPr lang="en-US" altLang="zh-TW" dirty="0"/>
+              <a:t>y</a:t>
+            </a:r>
+            <a:r>
+              <a:rPr lang="zh-TW" altLang="en-US" dirty="0"/>
+              <a:t>。但在很多科學應用中，我們想要學的是函數到函數的映射，也就是所謂的「算子」。這篇論文提出了 </a:t>
+            </a:r>
+            <a:r>
+              <a:rPr lang="en-US" altLang="zh-TW" dirty="0" err="1"/>
+              <a:t>DeepONet</a:t>
+            </a:r>
+            <a:r>
+              <a:rPr lang="en-US" altLang="zh-TW" dirty="0"/>
+              <a:t> </a:t>
+            </a:r>
+            <a:r>
+              <a:rPr lang="zh-TW" altLang="en-US" dirty="0"/>
+              <a:t>架構，用兩個子網路實現對算子的學習，並展現出比傳統模型更好的泛化能力。</a:t>
+            </a:r>
+          </a:p>
+        </p:txBody>
+      </p:sp>
+      <p:sp>
+        <p:nvSpPr>
+          <p:cNvPr id="4" name="投影片編號版面配置區 3"/>
+          <p:cNvSpPr>
+            <a:spLocks noGrp="1"/>
+          </p:cNvSpPr>
+          <p:nvPr>
+            <p:ph type="sldNum" sz="quarter" idx="5"/>
+          </p:nvPr>
+        </p:nvSpPr>
+        <p:spPr/>
+        <p:txBody>
+          <a:bodyPr/>
+          <a:lstStyle/>
+          <a:p>
+            <a:fld id="{53F37B9E-6BA1-42D6-AAD5-58D48F5C5ABC}" type="slidenum">
+              <a:rPr lang="zh-TW" altLang="en-US" smtClean="0"/>
+              <a:t>3</a:t>
+            </a:fld>
+            <a:endParaRPr lang="zh-TW" altLang="en-US"/>
+          </a:p>
+        </p:txBody>
+      </p:sp>
+    </p:spTree>
+    <p:extLst>
+      <p:ext uri="{BB962C8B-B14F-4D97-AF65-F5344CB8AC3E}">
+        <p14:creationId xmlns:p14="http://schemas.microsoft.com/office/powerpoint/2010/main" val="997940931"/>
+      </p:ext>
+    </p:extLst>
+  </p:cSld>
+  <p:clrMapOvr>
+    <a:masterClrMapping/>
+  </p:clrMapOvr>
+</p:notes>
+</file>
+
+<file path=ppt/notesSlides/notesSlide4.xml><?xml version="1.0" encoding="utf-8"?>
+<p:notes xmlns:a="http://schemas.openxmlformats.org/drawingml/2006/main" xmlns:r="http://schemas.openxmlformats.org/officeDocument/2006/relationships" xmlns:p="http://schemas.openxmlformats.org/presentationml/2006/main">
+  <p:cSld>
+    <p:spTree>
+      <p:nvGrpSpPr>
+        <p:cNvPr id="1" name=""/>
+        <p:cNvGrpSpPr/>
+        <p:nvPr/>
+      </p:nvGrpSpPr>
+      <p:grpSpPr>
+        <a:xfrm>
+          <a:off x="0" y="0"/>
+          <a:ext cx="0" cy="0"/>
+          <a:chOff x="0" y="0"/>
+          <a:chExt cx="0" cy="0"/>
+        </a:xfrm>
+      </p:grpSpPr>
+      <p:sp>
+        <p:nvSpPr>
+          <p:cNvPr id="2" name="投影片影像版面配置區 1"/>
+          <p:cNvSpPr>
+            <a:spLocks noGrp="1" noRot="1" noChangeAspect="1"/>
+          </p:cNvSpPr>
+          <p:nvPr>
+            <p:ph type="sldImg"/>
+          </p:nvPr>
+        </p:nvSpPr>
+        <p:spPr/>
+      </p:sp>
+      <p:sp>
+        <p:nvSpPr>
+          <p:cNvPr id="3" name="備忘稿版面配置區 2"/>
+          <p:cNvSpPr>
+            <a:spLocks noGrp="1"/>
+          </p:cNvSpPr>
+          <p:nvPr>
+            <p:ph type="body" idx="1"/>
+          </p:nvPr>
+        </p:nvSpPr>
+        <p:spPr/>
+        <p:txBody>
+          <a:bodyPr/>
+          <a:lstStyle/>
+          <a:p>
+            <a:pPr marL="0" marR="0" lvl="0" indent="0" algn="l" defTabSz="914400" rtl="0" eaLnBrk="1" fontAlgn="auto" latinLnBrk="0" hangingPunct="1">
+              <a:lnSpc>
+                <a:spcPct val="100000"/>
+              </a:lnSpc>
+              <a:spcBef>
+                <a:spcPts val="0"/>
+              </a:spcBef>
+              <a:spcAft>
+                <a:spcPts val="0"/>
+              </a:spcAft>
+              <a:buClrTx/>
+              <a:buSzTx/>
+              <a:buFontTx/>
+              <a:buNone/>
+              <a:tabLst/>
+              <a:defRPr/>
+            </a:pPr>
+            <a:r>
+              <a:rPr lang="zh-TW" altLang="en-US" dirty="0"/>
+              <a:t>所謂的算子，是把一個函數轉換成另一個函數的映射，例如微分、積分，或解偏微分方程。這類映射在物理與工程領域中非常常見，也因此學習算子對於許多實際應用來說非常重要。</a:t>
+            </a:r>
+          </a:p>
+          <a:p>
+            <a:endParaRPr lang="zh-TW" altLang="en-US" dirty="0"/>
+          </a:p>
+        </p:txBody>
+      </p:sp>
+      <p:sp>
+        <p:nvSpPr>
+          <p:cNvPr id="4" name="投影片編號版面配置區 3"/>
+          <p:cNvSpPr>
+            <a:spLocks noGrp="1"/>
+          </p:cNvSpPr>
+          <p:nvPr>
+            <p:ph type="sldNum" sz="quarter" idx="5"/>
+          </p:nvPr>
+        </p:nvSpPr>
+        <p:spPr/>
+        <p:txBody>
+          <a:bodyPr/>
+          <a:lstStyle/>
+          <a:p>
+            <a:fld id="{53F37B9E-6BA1-42D6-AAD5-58D48F5C5ABC}" type="slidenum">
+              <a:rPr lang="zh-TW" altLang="en-US" smtClean="0"/>
+              <a:t>4</a:t>
+            </a:fld>
+            <a:endParaRPr lang="zh-TW" altLang="en-US"/>
+          </a:p>
+        </p:txBody>
+      </p:sp>
+    </p:spTree>
+    <p:extLst>
+      <p:ext uri="{BB962C8B-B14F-4D97-AF65-F5344CB8AC3E}">
+        <p14:creationId xmlns:p14="http://schemas.microsoft.com/office/powerpoint/2010/main" val="2676716308"/>
+      </p:ext>
+    </p:extLst>
+  </p:cSld>
+  <p:clrMapOvr>
+    <a:masterClrMapping/>
+  </p:clrMapOvr>
+</p:notes>
+</file>
+
+<file path=ppt/notesSlides/notesSlide5.xml><?xml version="1.0" encoding="utf-8"?>
+<p:notes xmlns:a="http://schemas.openxmlformats.org/drawingml/2006/main" xmlns:r="http://schemas.openxmlformats.org/officeDocument/2006/relationships" xmlns:p="http://schemas.openxmlformats.org/presentationml/2006/main">
+  <p:cSld>
+    <p:spTree>
+      <p:nvGrpSpPr>
+        <p:cNvPr id="1" name=""/>
+        <p:cNvGrpSpPr/>
+        <p:nvPr/>
+      </p:nvGrpSpPr>
+      <p:grpSpPr>
+        <a:xfrm>
+          <a:off x="0" y="0"/>
+          <a:ext cx="0" cy="0"/>
+          <a:chOff x="0" y="0"/>
+          <a:chExt cx="0" cy="0"/>
+        </a:xfrm>
+      </p:grpSpPr>
+      <p:sp>
+        <p:nvSpPr>
+          <p:cNvPr id="2" name="投影片影像版面配置區 1"/>
+          <p:cNvSpPr>
+            <a:spLocks noGrp="1" noRot="1" noChangeAspect="1"/>
+          </p:cNvSpPr>
+          <p:nvPr>
+            <p:ph type="sldImg"/>
+          </p:nvPr>
+        </p:nvSpPr>
+        <p:spPr/>
+      </p:sp>
+      <p:sp>
+        <p:nvSpPr>
+          <p:cNvPr id="3" name="備忘稿版面配置區 2"/>
+          <p:cNvSpPr>
+            <a:spLocks noGrp="1"/>
+          </p:cNvSpPr>
+          <p:nvPr>
+            <p:ph type="body" idx="1"/>
+          </p:nvPr>
+        </p:nvSpPr>
+        <p:spPr/>
+        <p:txBody>
+          <a:bodyPr/>
+          <a:lstStyle/>
+          <a:p>
+            <a:pPr marL="0" marR="0" lvl="0" indent="0" algn="l" defTabSz="914400" rtl="0" eaLnBrk="1" fontAlgn="auto" latinLnBrk="0" hangingPunct="1">
+              <a:lnSpc>
+                <a:spcPct val="100000"/>
+              </a:lnSpc>
+              <a:spcBef>
+                <a:spcPts val="0"/>
+              </a:spcBef>
+              <a:spcAft>
+                <a:spcPts val="0"/>
+              </a:spcAft>
+              <a:buClrTx/>
+              <a:buSzTx/>
+              <a:buFontTx/>
+              <a:buNone/>
+              <a:tabLst/>
+              <a:defRPr/>
+            </a:pPr>
+            <a:r>
+              <a:rPr lang="zh-TW" altLang="en-US" dirty="0"/>
+              <a:t>我們可以這樣想：你有一個輸入函數 </a:t>
+            </a:r>
+            <a:r>
+              <a:rPr lang="en-US" altLang="zh-TW" dirty="0"/>
+              <a:t>u</a:t>
+            </a:r>
+            <a:r>
+              <a:rPr lang="zh-TW" altLang="en-US" dirty="0"/>
+              <a:t>，經過算子 </a:t>
+            </a:r>
+            <a:r>
+              <a:rPr lang="en-US" altLang="zh-TW" dirty="0"/>
+              <a:t>G </a:t>
+            </a:r>
+            <a:r>
+              <a:rPr lang="zh-TW" altLang="en-US" dirty="0"/>
+              <a:t>的轉換，會變成一個新的函數 </a:t>
+            </a:r>
+            <a:r>
+              <a:rPr lang="en-US" altLang="zh-TW" dirty="0"/>
+              <a:t>s</a:t>
+            </a:r>
+            <a:r>
+              <a:rPr lang="zh-TW" altLang="en-US" dirty="0"/>
+              <a:t>，也就是 </a:t>
+            </a:r>
+            <a:r>
+              <a:rPr lang="en-US" altLang="zh-TW" dirty="0"/>
+              <a:t>G(u)</a:t>
+            </a:r>
+            <a:r>
+              <a:rPr lang="zh-TW" altLang="en-US" dirty="0"/>
+              <a:t>。我們通常關心的是，這個輸出函數在某一點 </a:t>
+            </a:r>
+            <a:r>
+              <a:rPr lang="en-US" altLang="zh-TW" dirty="0"/>
+              <a:t>y </a:t>
+            </a:r>
+            <a:r>
+              <a:rPr lang="zh-TW" altLang="en-US" dirty="0"/>
+              <a:t>上的值，也就是 </a:t>
+            </a:r>
+            <a:r>
+              <a:rPr lang="en-US" altLang="zh-TW" dirty="0"/>
+              <a:t>G(u)(y)</a:t>
+            </a:r>
+            <a:r>
+              <a:rPr lang="zh-TW" altLang="en-US" dirty="0"/>
+              <a:t>。</a:t>
+            </a:r>
+          </a:p>
+          <a:p>
+            <a:endParaRPr lang="zh-TW" altLang="en-US" dirty="0"/>
+          </a:p>
+        </p:txBody>
+      </p:sp>
+      <p:sp>
+        <p:nvSpPr>
+          <p:cNvPr id="4" name="投影片編號版面配置區 3"/>
+          <p:cNvSpPr>
+            <a:spLocks noGrp="1"/>
+          </p:cNvSpPr>
+          <p:nvPr>
+            <p:ph type="sldNum" sz="quarter" idx="5"/>
+          </p:nvPr>
+        </p:nvSpPr>
+        <p:spPr/>
+        <p:txBody>
+          <a:bodyPr/>
+          <a:lstStyle/>
+          <a:p>
+            <a:fld id="{53F37B9E-6BA1-42D6-AAD5-58D48F5C5ABC}" type="slidenum">
+              <a:rPr lang="zh-TW" altLang="en-US" smtClean="0"/>
+              <a:t>5</a:t>
+            </a:fld>
+            <a:endParaRPr lang="zh-TW" altLang="en-US"/>
+          </a:p>
+        </p:txBody>
+      </p:sp>
+    </p:spTree>
+    <p:extLst>
+      <p:ext uri="{BB962C8B-B14F-4D97-AF65-F5344CB8AC3E}">
+        <p14:creationId xmlns:p14="http://schemas.microsoft.com/office/powerpoint/2010/main" val="107295871"/>
+      </p:ext>
+    </p:extLst>
+  </p:cSld>
+  <p:clrMapOvr>
+    <a:masterClrMapping/>
+  </p:clrMapOvr>
+</p:notes>
+</file>
+
+<file path=ppt/notesSlides/notesSlide6.xml><?xml version="1.0" encoding="utf-8"?>
+<p:notes xmlns:a="http://schemas.openxmlformats.org/drawingml/2006/main" xmlns:r="http://schemas.openxmlformats.org/officeDocument/2006/relationships" xmlns:p="http://schemas.openxmlformats.org/presentationml/2006/main">
+  <p:cSld>
+    <p:spTree>
+      <p:nvGrpSpPr>
+        <p:cNvPr id="1" name=""/>
+        <p:cNvGrpSpPr/>
+        <p:nvPr/>
+      </p:nvGrpSpPr>
+      <p:grpSpPr>
+        <a:xfrm>
+          <a:off x="0" y="0"/>
+          <a:ext cx="0" cy="0"/>
+          <a:chOff x="0" y="0"/>
+          <a:chExt cx="0" cy="0"/>
+        </a:xfrm>
+      </p:grpSpPr>
+      <p:sp>
+        <p:nvSpPr>
+          <p:cNvPr id="2" name="投影片影像版面配置區 1"/>
+          <p:cNvSpPr>
+            <a:spLocks noGrp="1" noRot="1" noChangeAspect="1"/>
+          </p:cNvSpPr>
+          <p:nvPr>
+            <p:ph type="sldImg"/>
+          </p:nvPr>
+        </p:nvSpPr>
+        <p:spPr/>
+      </p:sp>
+      <p:sp>
+        <p:nvSpPr>
+          <p:cNvPr id="3" name="備忘稿版面配置區 2"/>
+          <p:cNvSpPr>
+            <a:spLocks noGrp="1"/>
+          </p:cNvSpPr>
+          <p:nvPr>
+            <p:ph type="body" idx="1"/>
+          </p:nvPr>
+        </p:nvSpPr>
+        <p:spPr/>
+        <p:txBody>
+          <a:bodyPr/>
+          <a:lstStyle/>
+          <a:p>
+            <a:r>
+              <a:rPr lang="zh-TW" altLang="en-US" dirty="0"/>
+              <a:t>這邊舉個例子來說明：如果我們輸入的是一個拋物線函數 </a:t>
+            </a:r>
+            <a:r>
+              <a:rPr lang="en-US" altLang="zh-TW" dirty="0"/>
+              <a:t>u(x) = x²</a:t>
+            </a:r>
+            <a:r>
+              <a:rPr lang="zh-TW" altLang="en-US" dirty="0"/>
+              <a:t>，經過微分算子 </a:t>
+            </a:r>
+            <a:r>
+              <a:rPr lang="en-US" altLang="zh-TW" dirty="0"/>
+              <a:t>d/dx </a:t>
+            </a:r>
+            <a:r>
+              <a:rPr lang="zh-TW" altLang="en-US" dirty="0"/>
+              <a:t>處理後，我們會得到一個新的函數 </a:t>
+            </a:r>
+            <a:r>
+              <a:rPr lang="en-US" altLang="zh-TW" dirty="0"/>
+              <a:t>s(t) = 2t</a:t>
+            </a:r>
+            <a:r>
+              <a:rPr lang="zh-TW" altLang="en-US" dirty="0"/>
+              <a:t>。我們只要把 </a:t>
+            </a:r>
+            <a:r>
+              <a:rPr lang="en-US" altLang="zh-TW" dirty="0"/>
+              <a:t>y </a:t>
+            </a:r>
+            <a:r>
+              <a:rPr lang="zh-TW" altLang="en-US" dirty="0"/>
+              <a:t>代進去，就可以得到輸出函數的值，比如 </a:t>
+            </a:r>
+            <a:r>
+              <a:rPr lang="en-US" altLang="zh-TW" dirty="0"/>
+              <a:t>y=3</a:t>
+            </a:r>
+            <a:r>
+              <a:rPr lang="zh-TW" altLang="en-US" dirty="0"/>
+              <a:t>，輸出就是 </a:t>
+            </a:r>
+            <a:r>
+              <a:rPr lang="en-US" altLang="zh-TW" dirty="0"/>
+              <a:t>6</a:t>
+            </a:r>
+            <a:r>
+              <a:rPr lang="zh-TW" altLang="en-US" dirty="0"/>
+              <a:t>。</a:t>
+            </a:r>
+          </a:p>
+        </p:txBody>
+      </p:sp>
+      <p:sp>
+        <p:nvSpPr>
+          <p:cNvPr id="4" name="投影片編號版面配置區 3"/>
+          <p:cNvSpPr>
+            <a:spLocks noGrp="1"/>
+          </p:cNvSpPr>
+          <p:nvPr>
+            <p:ph type="sldNum" sz="quarter" idx="5"/>
+          </p:nvPr>
+        </p:nvSpPr>
+        <p:spPr/>
+        <p:txBody>
+          <a:bodyPr/>
+          <a:lstStyle/>
+          <a:p>
+            <a:fld id="{53F37B9E-6BA1-42D6-AAD5-58D48F5C5ABC}" type="slidenum">
+              <a:rPr lang="zh-TW" altLang="en-US" smtClean="0"/>
+              <a:t>6</a:t>
+            </a:fld>
+            <a:endParaRPr lang="zh-TW" altLang="en-US"/>
+          </a:p>
+        </p:txBody>
+      </p:sp>
+    </p:spTree>
+    <p:extLst>
+      <p:ext uri="{BB962C8B-B14F-4D97-AF65-F5344CB8AC3E}">
+        <p14:creationId xmlns:p14="http://schemas.microsoft.com/office/powerpoint/2010/main" val="3086064030"/>
+      </p:ext>
+    </p:extLst>
+  </p:cSld>
+  <p:clrMapOvr>
+    <a:masterClrMapping/>
+  </p:clrMapOvr>
+</p:notes>
+</file>
+
+<file path=ppt/notesSlides/notesSlide7.xml><?xml version="1.0" encoding="utf-8"?>
+<p:notes xmlns:a="http://schemas.openxmlformats.org/drawingml/2006/main" xmlns:r="http://schemas.openxmlformats.org/officeDocument/2006/relationships" xmlns:p="http://schemas.openxmlformats.org/presentationml/2006/main">
+  <p:cSld>
+    <p:spTree>
+      <p:nvGrpSpPr>
+        <p:cNvPr id="1" name=""/>
+        <p:cNvGrpSpPr/>
+        <p:nvPr/>
+      </p:nvGrpSpPr>
+      <p:grpSpPr>
+        <a:xfrm>
+          <a:off x="0" y="0"/>
+          <a:ext cx="0" cy="0"/>
+          <a:chOff x="0" y="0"/>
+          <a:chExt cx="0" cy="0"/>
+        </a:xfrm>
+      </p:grpSpPr>
+      <p:sp>
+        <p:nvSpPr>
+          <p:cNvPr id="2" name="投影片影像版面配置區 1"/>
+          <p:cNvSpPr>
+            <a:spLocks noGrp="1" noRot="1" noChangeAspect="1"/>
+          </p:cNvSpPr>
+          <p:nvPr>
+            <p:ph type="sldImg"/>
+          </p:nvPr>
+        </p:nvSpPr>
+        <p:spPr/>
+      </p:sp>
+      <p:sp>
+        <p:nvSpPr>
+          <p:cNvPr id="3" name="備忘稿版面配置區 2"/>
+          <p:cNvSpPr>
+            <a:spLocks noGrp="1"/>
+          </p:cNvSpPr>
+          <p:nvPr>
+            <p:ph type="body" idx="1"/>
+          </p:nvPr>
+        </p:nvSpPr>
+        <p:spPr/>
+        <p:txBody>
+          <a:bodyPr/>
+          <a:lstStyle/>
+          <a:p>
+            <a:pPr marL="0" marR="0" lvl="0" indent="0" algn="l" defTabSz="914400" rtl="0" eaLnBrk="1" fontAlgn="auto" latinLnBrk="0" hangingPunct="1">
+              <a:lnSpc>
+                <a:spcPct val="100000"/>
+              </a:lnSpc>
+              <a:spcBef>
+                <a:spcPts val="0"/>
+              </a:spcBef>
+              <a:spcAft>
+                <a:spcPts val="0"/>
+              </a:spcAft>
+              <a:buClrTx/>
+              <a:buSzTx/>
+              <a:buFontTx/>
+              <a:buNone/>
+              <a:tabLst/>
+              <a:defRPr/>
+            </a:pPr>
+            <a:r>
+              <a:rPr lang="en-US" altLang="zh-TW" dirty="0" err="1"/>
+              <a:t>DeepONet</a:t>
+            </a:r>
+            <a:r>
+              <a:rPr lang="en-US" altLang="zh-TW" dirty="0"/>
+              <a:t> </a:t>
+            </a:r>
+            <a:r>
+              <a:rPr lang="zh-TW" altLang="en-US" dirty="0"/>
+              <a:t>是由兩個子網構成的：分支網路（</a:t>
+            </a:r>
+            <a:r>
+              <a:rPr lang="en-US" altLang="zh-TW" dirty="0"/>
+              <a:t>Branch Network</a:t>
+            </a:r>
+            <a:r>
+              <a:rPr lang="zh-TW" altLang="en-US" dirty="0"/>
+              <a:t>）輸入的是函數 </a:t>
+            </a:r>
+            <a:r>
+              <a:rPr lang="en-US" altLang="zh-TW" dirty="0"/>
+              <a:t>u </a:t>
+            </a:r>
+            <a:r>
+              <a:rPr lang="zh-TW" altLang="en-US" dirty="0"/>
+              <a:t>的感測器值，主幹網路（</a:t>
+            </a:r>
+            <a:r>
+              <a:rPr lang="en-US" altLang="zh-TW" dirty="0"/>
+              <a:t>Trunk Network</a:t>
+            </a:r>
+            <a:r>
+              <a:rPr lang="zh-TW" altLang="en-US" dirty="0"/>
+              <a:t>）則輸入查詢位置 </a:t>
+            </a:r>
+            <a:r>
+              <a:rPr lang="en-US" altLang="zh-TW" dirty="0"/>
+              <a:t>y</a:t>
+            </a:r>
+            <a:r>
+              <a:rPr lang="zh-TW" altLang="en-US" dirty="0"/>
+              <a:t>。兩者的輸出做內積後，再加上偏置項 </a:t>
+            </a:r>
+            <a:r>
+              <a:rPr lang="en-US" altLang="zh-TW" dirty="0"/>
+              <a:t>b₀</a:t>
+            </a:r>
+            <a:r>
+              <a:rPr lang="zh-TW" altLang="en-US" dirty="0"/>
+              <a:t>，就得到 </a:t>
+            </a:r>
+            <a:r>
+              <a:rPr lang="en-US" altLang="zh-TW" dirty="0"/>
+              <a:t>G(u)(y) </a:t>
+            </a:r>
+            <a:r>
+              <a:rPr lang="zh-TW" altLang="en-US" dirty="0"/>
+              <a:t>的估計值。</a:t>
+            </a:r>
+          </a:p>
+          <a:p>
+            <a:endParaRPr lang="zh-TW" altLang="en-US" dirty="0"/>
+          </a:p>
+        </p:txBody>
+      </p:sp>
+      <p:sp>
+        <p:nvSpPr>
+          <p:cNvPr id="4" name="投影片編號版面配置區 3"/>
+          <p:cNvSpPr>
+            <a:spLocks noGrp="1"/>
+          </p:cNvSpPr>
+          <p:nvPr>
+            <p:ph type="sldNum" sz="quarter" idx="5"/>
+          </p:nvPr>
+        </p:nvSpPr>
+        <p:spPr/>
+        <p:txBody>
+          <a:bodyPr/>
+          <a:lstStyle/>
+          <a:p>
+            <a:fld id="{53F37B9E-6BA1-42D6-AAD5-58D48F5C5ABC}" type="slidenum">
+              <a:rPr lang="zh-TW" altLang="en-US" smtClean="0"/>
+              <a:t>7</a:t>
+            </a:fld>
+            <a:endParaRPr lang="zh-TW" altLang="en-US"/>
+          </a:p>
+        </p:txBody>
+      </p:sp>
+    </p:spTree>
+    <p:extLst>
+      <p:ext uri="{BB962C8B-B14F-4D97-AF65-F5344CB8AC3E}">
+        <p14:creationId xmlns:p14="http://schemas.microsoft.com/office/powerpoint/2010/main" val="1572609009"/>
+      </p:ext>
+    </p:extLst>
+  </p:cSld>
+  <p:clrMapOvr>
+    <a:masterClrMapping/>
+  </p:clrMapOvr>
+</p:notes>
+</file>
+
+<file path=ppt/notesSlides/notesSlide8.xml><?xml version="1.0" encoding="utf-8"?>
+<p:notes xmlns:a="http://schemas.openxmlformats.org/drawingml/2006/main" xmlns:r="http://schemas.openxmlformats.org/officeDocument/2006/relationships" xmlns:p="http://schemas.openxmlformats.org/presentationml/2006/main">
+  <p:cSld>
+    <p:spTree>
+      <p:nvGrpSpPr>
+        <p:cNvPr id="1" name=""/>
+        <p:cNvGrpSpPr/>
+        <p:nvPr/>
+      </p:nvGrpSpPr>
+      <p:grpSpPr>
+        <a:xfrm>
+          <a:off x="0" y="0"/>
+          <a:ext cx="0" cy="0"/>
+          <a:chOff x="0" y="0"/>
+          <a:chExt cx="0" cy="0"/>
+        </a:xfrm>
+      </p:grpSpPr>
+      <p:sp>
+        <p:nvSpPr>
+          <p:cNvPr id="2" name="投影片影像版面配置區 1"/>
+          <p:cNvSpPr>
+            <a:spLocks noGrp="1" noRot="1" noChangeAspect="1"/>
+          </p:cNvSpPr>
+          <p:nvPr>
+            <p:ph type="sldImg"/>
+          </p:nvPr>
+        </p:nvSpPr>
+        <p:spPr/>
+      </p:sp>
+      <p:sp>
+        <p:nvSpPr>
+          <p:cNvPr id="3" name="備忘稿版面配置區 2"/>
+          <p:cNvSpPr>
+            <a:spLocks noGrp="1"/>
+          </p:cNvSpPr>
+          <p:nvPr>
+            <p:ph type="body" idx="1"/>
+          </p:nvPr>
+        </p:nvSpPr>
+        <p:spPr/>
+        <p:txBody>
+          <a:bodyPr/>
+          <a:lstStyle/>
+          <a:p>
+            <a:pPr marL="0" marR="0" lvl="0" indent="0" algn="l" defTabSz="914400" rtl="0" eaLnBrk="1" fontAlgn="auto" latinLnBrk="0" hangingPunct="1">
+              <a:lnSpc>
+                <a:spcPct val="100000"/>
+              </a:lnSpc>
+              <a:spcBef>
+                <a:spcPts val="0"/>
+              </a:spcBef>
+              <a:spcAft>
+                <a:spcPts val="0"/>
+              </a:spcAft>
+              <a:buClrTx/>
+              <a:buSzTx/>
+              <a:buFontTx/>
+              <a:buNone/>
+              <a:tabLst/>
+              <a:defRPr/>
+            </a:pPr>
+            <a:r>
+              <a:rPr lang="zh-TW" altLang="en-US" dirty="0"/>
+              <a:t>這一頁主要是示意圖，讓我們清楚知道整個 </a:t>
+            </a:r>
+            <a:r>
+              <a:rPr lang="en-US" altLang="zh-TW" dirty="0" err="1"/>
+              <a:t>DeepONet</a:t>
+            </a:r>
+            <a:r>
+              <a:rPr lang="en-US" altLang="zh-TW" dirty="0"/>
+              <a:t> </a:t>
+            </a:r>
+            <a:r>
+              <a:rPr lang="zh-TW" altLang="en-US" dirty="0"/>
+              <a:t>架構的輸入與輸出關係。</a:t>
+            </a:r>
+          </a:p>
+          <a:p>
+            <a:endParaRPr lang="zh-TW" altLang="en-US" dirty="0"/>
+          </a:p>
+        </p:txBody>
+      </p:sp>
+      <p:sp>
+        <p:nvSpPr>
+          <p:cNvPr id="4" name="投影片編號版面配置區 3"/>
+          <p:cNvSpPr>
+            <a:spLocks noGrp="1"/>
+          </p:cNvSpPr>
+          <p:nvPr>
+            <p:ph type="sldNum" sz="quarter" idx="5"/>
+          </p:nvPr>
+        </p:nvSpPr>
+        <p:spPr/>
+        <p:txBody>
+          <a:bodyPr/>
+          <a:lstStyle/>
+          <a:p>
+            <a:fld id="{53F37B9E-6BA1-42D6-AAD5-58D48F5C5ABC}" type="slidenum">
+              <a:rPr lang="zh-TW" altLang="en-US" smtClean="0"/>
+              <a:t>8</a:t>
+            </a:fld>
+            <a:endParaRPr lang="zh-TW" altLang="en-US"/>
+          </a:p>
+        </p:txBody>
+      </p:sp>
+    </p:spTree>
+    <p:extLst>
+      <p:ext uri="{BB962C8B-B14F-4D97-AF65-F5344CB8AC3E}">
+        <p14:creationId xmlns:p14="http://schemas.microsoft.com/office/powerpoint/2010/main" val="4263241317"/>
+      </p:ext>
+    </p:extLst>
+  </p:cSld>
+  <p:clrMapOvr>
+    <a:masterClrMapping/>
+  </p:clrMapOvr>
+</p:notes>
+</file>
+
+<file path=ppt/notesSlides/notesSlide9.xml><?xml version="1.0" encoding="utf-8"?>
+<p:notes xmlns:a="http://schemas.openxmlformats.org/drawingml/2006/main" xmlns:r="http://schemas.openxmlformats.org/officeDocument/2006/relationships" xmlns:p="http://schemas.openxmlformats.org/presentationml/2006/main">
+  <p:cSld>
+    <p:spTree>
+      <p:nvGrpSpPr>
+        <p:cNvPr id="1" name=""/>
+        <p:cNvGrpSpPr/>
+        <p:nvPr/>
+      </p:nvGrpSpPr>
+      <p:grpSpPr>
+        <a:xfrm>
+          <a:off x="0" y="0"/>
+          <a:ext cx="0" cy="0"/>
+          <a:chOff x="0" y="0"/>
+          <a:chExt cx="0" cy="0"/>
+        </a:xfrm>
+      </p:grpSpPr>
+      <p:sp>
+        <p:nvSpPr>
+          <p:cNvPr id="2" name="投影片影像版面配置區 1"/>
+          <p:cNvSpPr>
+            <a:spLocks noGrp="1" noRot="1" noChangeAspect="1"/>
+          </p:cNvSpPr>
+          <p:nvPr>
+            <p:ph type="sldImg"/>
+          </p:nvPr>
+        </p:nvSpPr>
+        <p:spPr/>
+      </p:sp>
+      <p:sp>
+        <p:nvSpPr>
+          <p:cNvPr id="3" name="備忘稿版面配置區 2"/>
+          <p:cNvSpPr>
+            <a:spLocks noGrp="1"/>
+          </p:cNvSpPr>
+          <p:nvPr>
+            <p:ph type="body" idx="1"/>
+          </p:nvPr>
+        </p:nvSpPr>
+        <p:spPr/>
+        <p:txBody>
+          <a:bodyPr/>
+          <a:lstStyle/>
+          <a:p>
+            <a:r>
+              <a:rPr lang="zh-TW" altLang="en-US" dirty="0"/>
+              <a:t>論文中也證明了 </a:t>
+            </a:r>
+            <a:r>
+              <a:rPr lang="en-US" altLang="zh-TW" dirty="0" err="1"/>
+              <a:t>DeepONet</a:t>
+            </a:r>
+            <a:r>
+              <a:rPr lang="en-US" altLang="zh-TW" dirty="0"/>
+              <a:t> </a:t>
+            </a:r>
+            <a:r>
+              <a:rPr lang="zh-TW" altLang="en-US" dirty="0"/>
+              <a:t>可以逼近任意的算子，這個結果是建立在算子通用近似定理之上。也就是說，只要有足夠的資料和網路容量，</a:t>
+            </a:r>
+            <a:r>
+              <a:rPr lang="en-US" altLang="zh-TW" dirty="0" err="1"/>
+              <a:t>DeepONet</a:t>
+            </a:r>
+            <a:r>
+              <a:rPr lang="en-US" altLang="zh-TW" dirty="0"/>
+              <a:t> </a:t>
+            </a:r>
+            <a:r>
+              <a:rPr lang="zh-TW" altLang="en-US" dirty="0"/>
+              <a:t>就有能力學習任何從函數到函數的映射。</a:t>
+            </a:r>
+          </a:p>
+        </p:txBody>
+      </p:sp>
+      <p:sp>
+        <p:nvSpPr>
+          <p:cNvPr id="4" name="投影片編號版面配置區 3"/>
+          <p:cNvSpPr>
+            <a:spLocks noGrp="1"/>
+          </p:cNvSpPr>
+          <p:nvPr>
+            <p:ph type="sldNum" sz="quarter" idx="5"/>
+          </p:nvPr>
+        </p:nvSpPr>
+        <p:spPr/>
+        <p:txBody>
+          <a:bodyPr/>
+          <a:lstStyle/>
+          <a:p>
+            <a:fld id="{53F37B9E-6BA1-42D6-AAD5-58D48F5C5ABC}" type="slidenum">
+              <a:rPr lang="zh-TW" altLang="en-US" smtClean="0"/>
+              <a:t>9</a:t>
+            </a:fld>
+            <a:endParaRPr lang="zh-TW" altLang="en-US"/>
+          </a:p>
+        </p:txBody>
+      </p:sp>
+    </p:spTree>
+    <p:extLst>
+      <p:ext uri="{BB962C8B-B14F-4D97-AF65-F5344CB8AC3E}">
+        <p14:creationId xmlns:p14="http://schemas.microsoft.com/office/powerpoint/2010/main" val="3810873577"/>
+      </p:ext>
+    </p:extLst>
+  </p:cSld>
+  <p:clrMapOvr>
+    <a:masterClrMapping/>
+  </p:clrMapOvr>
+</p:notes>
+</file>
+
 <file path=ppt/slideLayouts/slideLayout1.xml><?xml version="1.0" encoding="utf-8"?>
 <p:sldLayout xmlns:a="http://schemas.openxmlformats.org/drawingml/2006/main" xmlns:r="http://schemas.openxmlformats.org/officeDocument/2006/relationships" xmlns:p="http://schemas.openxmlformats.org/presentationml/2006/main" showMasterSp="0" type="title" preserve="1">
   <p:cSld name="標題投影片">
@@ -718,7 +3653,7 @@
           <a:p>
             <a:fld id="{DD39E5F1-E08E-43F3-A553-A708D17D1BF8}" type="datetime1">
               <a:rPr lang="zh-TW" altLang="en-US" smtClean="0"/>
-              <a:t>2025/6/4</a:t>
+              <a:t>2025/6/5</a:t>
             </a:fld>
             <a:endParaRPr lang="zh-TW" altLang="en-US"/>
           </a:p>
@@ -948,7 +3883,7 @@
           <a:p>
             <a:fld id="{8023CDAA-E8F7-402D-950D-844D237FCF27}" type="datetime1">
               <a:rPr lang="zh-TW" altLang="en-US" smtClean="0"/>
-              <a:t>2025/6/4</a:t>
+              <a:t>2025/6/5</a:t>
             </a:fld>
             <a:endParaRPr lang="zh-TW" altLang="en-US"/>
           </a:p>
@@ -1208,7 +4143,7 @@
           <a:p>
             <a:fld id="{2C775092-563F-4713-AEBB-C0A46C25AE93}" type="datetime1">
               <a:rPr lang="zh-TW" altLang="en-US" smtClean="0"/>
-              <a:t>2025/6/4</a:t>
+              <a:t>2025/6/5</a:t>
             </a:fld>
             <a:endParaRPr lang="zh-TW" altLang="en-US"/>
           </a:p>
@@ -1386,7 +4321,7 @@
           <a:p>
             <a:fld id="{A7C7393F-99B6-4D2B-B5AE-ABDD779DF928}" type="datetime1">
               <a:rPr lang="zh-TW" altLang="en-US" smtClean="0"/>
-              <a:t>2025/6/4</a:t>
+              <a:t>2025/6/5</a:t>
             </a:fld>
             <a:endParaRPr lang="zh-TW" altLang="en-US"/>
           </a:p>
@@ -1751,7 +4686,7 @@
           <a:p>
             <a:fld id="{188AB6F7-7AE6-477F-86AC-6723BFBD5768}" type="datetime1">
               <a:rPr lang="zh-TW" altLang="en-US" smtClean="0"/>
-              <a:t>2025/6/4</a:t>
+              <a:t>2025/6/5</a:t>
             </a:fld>
             <a:endParaRPr lang="zh-TW" altLang="en-US"/>
           </a:p>
@@ -2030,7 +4965,7 @@
           <a:p>
             <a:fld id="{EE5AE0B2-5711-499F-B3B3-5EB67150EE49}" type="datetime1">
               <a:rPr lang="zh-TW" altLang="en-US" smtClean="0"/>
-              <a:t>2025/6/4</a:t>
+              <a:t>2025/6/5</a:t>
             </a:fld>
             <a:endParaRPr lang="zh-TW" altLang="en-US"/>
           </a:p>
@@ -2413,7 +5348,7 @@
           <a:p>
             <a:fld id="{C057418B-6A0D-4436-820D-132984768679}" type="datetime1">
               <a:rPr lang="zh-TW" altLang="en-US" smtClean="0"/>
-              <a:t>2025/6/4</a:t>
+              <a:t>2025/6/5</a:t>
             </a:fld>
             <a:endParaRPr lang="zh-TW" altLang="en-US"/>
           </a:p>
@@ -2535,7 +5470,7 @@
           <a:p>
             <a:fld id="{BAA53972-495D-4C88-ABDD-85122BAA9E97}" type="datetime1">
               <a:rPr lang="zh-TW" altLang="en-US" smtClean="0"/>
-              <a:t>2025/6/4</a:t>
+              <a:t>2025/6/5</a:t>
             </a:fld>
             <a:endParaRPr lang="zh-TW" altLang="en-US"/>
           </a:p>
@@ -2710,7 +5645,7 @@
           <a:p>
             <a:fld id="{92274E07-62E5-43AD-ADC7-4EB09D1ABA1E}" type="datetime1">
               <a:rPr lang="zh-TW" altLang="en-US" smtClean="0"/>
-              <a:t>2025/6/4</a:t>
+              <a:t>2025/6/5</a:t>
             </a:fld>
             <a:endParaRPr lang="zh-TW" altLang="en-US"/>
           </a:p>
@@ -3068,7 +6003,7 @@
           <a:p>
             <a:fld id="{BD6C7B39-73CD-455F-A775-792355873340}" type="datetime1">
               <a:rPr lang="zh-TW" altLang="en-US" smtClean="0"/>
-              <a:t>2025/6/4</a:t>
+              <a:t>2025/6/5</a:t>
             </a:fld>
             <a:endParaRPr lang="zh-TW" altLang="en-US"/>
           </a:p>
@@ -3454,7 +6389,7 @@
           <a:p>
             <a:fld id="{54F5C322-9965-4B8C-BF6F-FD25979A7E4E}" type="datetime1">
               <a:rPr lang="zh-TW" altLang="en-US" smtClean="0"/>
-              <a:t>2025/6/4</a:t>
+              <a:t>2025/6/5</a:t>
             </a:fld>
             <a:endParaRPr lang="zh-TW" altLang="en-US"/>
           </a:p>
@@ -3745,7 +6680,7 @@
           <a:p>
             <a:fld id="{AC6F50C3-C1DF-4D72-AE48-78906386FDE6}" type="datetime1">
               <a:rPr lang="zh-TW" altLang="en-US" smtClean="0"/>
-              <a:t>2025/6/4</a:t>
+              <a:t>2025/6/5</a:t>
             </a:fld>
             <a:endParaRPr lang="zh-TW" altLang="en-US"/>
           </a:p>
@@ -5693,7 +8628,7 @@
                 <a:ext cx="9846732" cy="4351338"/>
               </a:xfrm>
               <a:blipFill>
-                <a:blip r:embed="rId2"/>
+                <a:blip r:embed="rId3"/>
                 <a:stretch>
                   <a:fillRect l="-743" t="-2101" r="-1486"/>
                 </a:stretch>
@@ -6358,7 +9293,7 @@
                 <a:ext cx="10515600" cy="4351338"/>
               </a:xfrm>
               <a:blipFill>
-                <a:blip r:embed="rId2"/>
+                <a:blip r:embed="rId3"/>
                 <a:stretch>
                   <a:fillRect l="-928" t="-1961" r="-1159"/>
                 </a:stretch>
@@ -6424,7 +9359,7 @@
           <p:nvPr/>
         </p:nvPicPr>
         <p:blipFill>
-          <a:blip r:embed="rId3">
+          <a:blip r:embed="rId4">
             <a:extLst>
               <a:ext uri="{28A0092B-C50C-407E-A947-70E740481C1C}">
                 <a14:useLocalDpi xmlns:a14="http://schemas.microsoft.com/office/drawing/2010/main" val="0"/>
@@ -6459,7 +9394,7 @@
           <p:nvPr/>
         </p:nvPicPr>
         <p:blipFill>
-          <a:blip r:embed="rId4">
+          <a:blip r:embed="rId5">
             <a:extLst>
               <a:ext uri="{28A0092B-C50C-407E-A947-70E740481C1C}">
                 <a14:useLocalDpi xmlns:a14="http://schemas.microsoft.com/office/drawing/2010/main" val="0"/>
@@ -7433,7 +10368,7 @@
                 <a:ext cx="10515600" cy="4351338"/>
               </a:xfrm>
               <a:blipFill>
-                <a:blip r:embed="rId2"/>
+                <a:blip r:embed="rId3"/>
                 <a:stretch>
                   <a:fillRect l="-928"/>
                 </a:stretch>
@@ -7594,7 +10529,7 @@
           </p:nvPr>
         </p:nvPicPr>
         <p:blipFill>
-          <a:blip r:embed="rId2">
+          <a:blip r:embed="rId3">
             <a:extLst>
               <a:ext uri="{28A0092B-C50C-407E-A947-70E740481C1C}">
                 <a14:useLocalDpi xmlns:a14="http://schemas.microsoft.com/office/drawing/2010/main" val="0"/>
@@ -10349,7 +13284,7 @@
           <p:nvPr/>
         </p:nvPicPr>
         <p:blipFill>
-          <a:blip r:embed="rId2">
+          <a:blip r:embed="rId3">
             <a:extLst>
               <a:ext uri="{28A0092B-C50C-407E-A947-70E740481C1C}">
                 <a14:useLocalDpi xmlns:a14="http://schemas.microsoft.com/office/drawing/2010/main" val="0"/>
@@ -10600,7 +13535,7 @@
           <p:nvPr/>
         </p:nvPicPr>
         <p:blipFill>
-          <a:blip r:embed="rId2">
+          <a:blip r:embed="rId3">
             <a:extLst>
               <a:ext uri="{28A0092B-C50C-407E-A947-70E740481C1C}">
                 <a14:useLocalDpi xmlns:a14="http://schemas.microsoft.com/office/drawing/2010/main" val="0"/>
@@ -11234,7 +14169,7 @@
                 <a:ext cx="10422467" cy="4667251"/>
               </a:xfrm>
               <a:blipFill>
-                <a:blip r:embed="rId2"/>
+                <a:blip r:embed="rId3"/>
                 <a:stretch>
                   <a:fillRect l="-585" r="-643"/>
                 </a:stretch>
@@ -11300,7 +14235,7 @@
           <p:nvPr/>
         </p:nvPicPr>
         <p:blipFill>
-          <a:blip r:embed="rId3"/>
+          <a:blip r:embed="rId4"/>
           <a:stretch>
             <a:fillRect/>
           </a:stretch>
@@ -11842,7 +14777,7 @@
           <p:nvPr/>
         </p:nvPicPr>
         <p:blipFill>
-          <a:blip r:embed="rId2"/>
+          <a:blip r:embed="rId3"/>
           <a:stretch>
             <a:fillRect/>
           </a:stretch>
@@ -12049,7 +14984,7 @@
           <p:nvPr/>
         </p:nvPicPr>
         <p:blipFill>
-          <a:blip r:embed="rId2">
+          <a:blip r:embed="rId3">
             <a:extLst>
               <a:ext uri="{28A0092B-C50C-407E-A947-70E740481C1C}">
                 <a14:useLocalDpi xmlns:a14="http://schemas.microsoft.com/office/drawing/2010/main" val="0"/>
@@ -12276,7 +15211,7 @@
           <p:nvPr/>
         </p:nvPicPr>
         <p:blipFill>
-          <a:blip r:embed="rId2">
+          <a:blip r:embed="rId3">
             <a:extLst>
               <a:ext uri="{28A0092B-C50C-407E-A947-70E740481C1C}">
                 <a14:useLocalDpi xmlns:a14="http://schemas.microsoft.com/office/drawing/2010/main" val="0"/>
@@ -12524,7 +15459,7 @@
           <p:nvPr/>
         </p:nvPicPr>
         <p:blipFill>
-          <a:blip r:embed="rId2">
+          <a:blip r:embed="rId3">
             <a:extLst>
               <a:ext uri="{28A0092B-C50C-407E-A947-70E740481C1C}">
                 <a14:useLocalDpi xmlns:a14="http://schemas.microsoft.com/office/drawing/2010/main" val="0"/>
@@ -12750,7 +15685,7 @@
           <p:nvPr/>
         </p:nvPicPr>
         <p:blipFill>
-          <a:blip r:embed="rId2">
+          <a:blip r:embed="rId3">
             <a:extLst>
               <a:ext uri="{28A0092B-C50C-407E-A947-70E740481C1C}">
                 <a14:useLocalDpi xmlns:a14="http://schemas.microsoft.com/office/drawing/2010/main" val="0"/>
@@ -13152,7 +16087,7 @@
           </p:nvPr>
         </p:nvPicPr>
         <p:blipFill>
-          <a:blip r:embed="rId2">
+          <a:blip r:embed="rId3">
             <a:extLst>
               <a:ext uri="{28A0092B-C50C-407E-A947-70E740481C1C}">
                 <a14:useLocalDpi xmlns:a14="http://schemas.microsoft.com/office/drawing/2010/main" val="0"/>
@@ -14711,7 +17646,7 @@
           <p:nvPr/>
         </p:nvPicPr>
         <p:blipFill>
-          <a:blip r:embed="rId2">
+          <a:blip r:embed="rId3">
             <a:extLst>
               <a:ext uri="{28A0092B-C50C-407E-A947-70E740481C1C}">
                 <a14:useLocalDpi xmlns:a14="http://schemas.microsoft.com/office/drawing/2010/main" val="0"/>
@@ -15948,7 +18883,7 @@
           <p:nvPr/>
         </p:nvPicPr>
         <p:blipFill>
-          <a:blip r:embed="rId2"/>
+          <a:blip r:embed="rId3"/>
           <a:stretch>
             <a:fillRect/>
           </a:stretch>
@@ -16041,7 +18976,7 @@
           </p:nvPr>
         </p:nvPicPr>
         <p:blipFill>
-          <a:blip r:embed="rId2">
+          <a:blip r:embed="rId3">
             <a:extLst>
               <a:ext uri="{28A0092B-C50C-407E-A947-70E740481C1C}">
                 <a14:useLocalDpi xmlns:a14="http://schemas.microsoft.com/office/drawing/2010/main" val="0"/>
@@ -16581,7 +19516,7 @@
                 <a:avLst/>
               </a:prstGeom>
               <a:blipFill>
-                <a:blip r:embed="rId3"/>
+                <a:blip r:embed="rId4"/>
                 <a:stretch>
                   <a:fillRect l="-1169" t="-1077"/>
                 </a:stretch>
@@ -16712,7 +19647,7 @@
           </p:nvPr>
         </p:nvPicPr>
         <p:blipFill>
-          <a:blip r:embed="rId2">
+          <a:blip r:embed="rId3">
             <a:extLst>
               <a:ext uri="{28A0092B-C50C-407E-A947-70E740481C1C}">
                 <a14:useLocalDpi xmlns:a14="http://schemas.microsoft.com/office/drawing/2010/main" val="0"/>

</xml_diff>

<commit_message>
Add defect in PPT
</commit_message>
<xml_diff>
--- a/類神經網路期末報告(0604).pptx
+++ b/類神經網路期末報告(0604).pptx
@@ -5,7 +5,7 @@
     <p:sldMasterId id="2147483660" r:id="rId1"/>
   </p:sldMasterIdLst>
   <p:notesMasterIdLst>
-    <p:notesMasterId r:id="rId31"/>
+    <p:notesMasterId r:id="rId32"/>
   </p:notesMasterIdLst>
   <p:sldIdLst>
     <p:sldId id="256" r:id="rId2"/>
@@ -35,8 +35,9 @@
     <p:sldId id="290" r:id="rId26"/>
     <p:sldId id="284" r:id="rId27"/>
     <p:sldId id="285" r:id="rId28"/>
-    <p:sldId id="292" r:id="rId29"/>
-    <p:sldId id="291" r:id="rId30"/>
+    <p:sldId id="307" r:id="rId29"/>
+    <p:sldId id="292" r:id="rId30"/>
+    <p:sldId id="291" r:id="rId31"/>
   </p:sldIdLst>
   <p:sldSz cx="12192000" cy="6858000"/>
   <p:notesSz cx="6858000" cy="9144000"/>
@@ -2381,8 +2382,18 @@
           <a:lstStyle/>
           <a:p>
             <a:r>
+              <a:rPr lang="en-US" altLang="zh-TW" b="1" dirty="0"/>
+              <a:t>1. </a:t>
+            </a:r>
+            <a:r>
+              <a:rPr lang="zh-TW" altLang="en-US" b="1" dirty="0"/>
+              <a:t>算力需求較高</a:t>
+            </a:r>
+          </a:p>
+          <a:p>
+            <a:r>
               <a:rPr lang="zh-TW" altLang="en-US" dirty="0"/>
-              <a:t>我們這次報告主要參考了論文原文與幾篇深入解釋 </a:t>
+              <a:t>首先，訓練 </a:t>
             </a:r>
             <a:r>
               <a:rPr lang="en-US" altLang="zh-TW" dirty="0" err="1"/>
@@ -2394,8 +2405,99 @@
             </a:r>
             <a:r>
               <a:rPr lang="zh-TW" altLang="en-US" dirty="0"/>
-              <a:t>的文章，有興趣的同學也可以再深入閱讀。</a:t>
-            </a:r>
+              <a:t>需要相當高的計算資源，尤其是在處理大規模運算符學習問題時，可能</a:t>
+            </a:r>
+            <a:r>
+              <a:rPr lang="zh-TW" altLang="en-US"/>
+              <a:t>會遇到記憶體不足</a:t>
+            </a:r>
+            <a:r>
+              <a:rPr lang="zh-TW" altLang="en-US" dirty="0"/>
+              <a:t>或 </a:t>
+            </a:r>
+            <a:r>
+              <a:rPr lang="en-US" altLang="zh-TW" dirty="0"/>
+              <a:t>GPU </a:t>
+            </a:r>
+            <a:r>
+              <a:rPr lang="zh-TW" altLang="en-US" dirty="0"/>
+              <a:t>計算瓶頸的問題。這點在實際應用上會是一個門檻，尤其對學術單位或中小型團隊來說。</a:t>
+            </a:r>
+            <a:endParaRPr lang="en-US" altLang="zh-TW" dirty="0"/>
+          </a:p>
+          <a:p>
+            <a:endParaRPr lang="zh-TW" altLang="en-US" dirty="0"/>
+          </a:p>
+          <a:p>
+            <a:r>
+              <a:rPr lang="en-US" altLang="zh-TW" b="1" dirty="0"/>
+              <a:t>2. </a:t>
+            </a:r>
+            <a:r>
+              <a:rPr lang="zh-TW" altLang="en-US" b="1" dirty="0"/>
+              <a:t>缺乏物理可解釋性</a:t>
+            </a:r>
+          </a:p>
+          <a:p>
+            <a:r>
+              <a:rPr lang="zh-TW" altLang="en-US" dirty="0"/>
+              <a:t>第二個限制是 </a:t>
+            </a:r>
+            <a:r>
+              <a:rPr lang="en-US" altLang="zh-TW" dirty="0" err="1"/>
+              <a:t>DeepONet</a:t>
+            </a:r>
+            <a:r>
+              <a:rPr lang="en-US" altLang="zh-TW" dirty="0"/>
+              <a:t> </a:t>
+            </a:r>
+            <a:r>
+              <a:rPr lang="zh-TW" altLang="en-US" dirty="0"/>
+              <a:t>雖然能夠準確學習運算符，但它不像傳統的數值方法一樣，能夠給出清晰的數學結構或物理意義。這在需要可解釋模型的工程應用中，可能會受到質疑或限制。</a:t>
+            </a:r>
+            <a:endParaRPr lang="en-US" altLang="zh-TW" dirty="0"/>
+          </a:p>
+          <a:p>
+            <a:endParaRPr lang="zh-TW" altLang="en-US" dirty="0"/>
+          </a:p>
+          <a:p>
+            <a:r>
+              <a:rPr lang="en-US" altLang="zh-TW" b="1" dirty="0"/>
+              <a:t>3. </a:t>
+            </a:r>
+            <a:r>
+              <a:rPr lang="zh-TW" altLang="en-US" b="1" dirty="0"/>
+              <a:t>對邊界條件與初始條件的依賴性</a:t>
+            </a:r>
+          </a:p>
+          <a:p>
+            <a:r>
+              <a:rPr lang="zh-TW" altLang="en-US" dirty="0"/>
+              <a:t>最後一點是 </a:t>
+            </a:r>
+            <a:r>
+              <a:rPr lang="en-US" altLang="zh-TW" dirty="0" err="1"/>
+              <a:t>DeepONet</a:t>
+            </a:r>
+            <a:r>
+              <a:rPr lang="en-US" altLang="zh-TW" dirty="0"/>
+              <a:t> </a:t>
+            </a:r>
+            <a:r>
+              <a:rPr lang="zh-TW" altLang="en-US" dirty="0"/>
+              <a:t>對於 </a:t>
+            </a:r>
+            <a:r>
+              <a:rPr lang="en-US" altLang="zh-TW" dirty="0"/>
+              <a:t>PDE </a:t>
+            </a:r>
+            <a:r>
+              <a:rPr lang="zh-TW" altLang="en-US" dirty="0"/>
+              <a:t>問題中的邊界與初始條件相當敏感。也就是說，如果這些條件稍有不同，模型可能會產生不穩定的預測結果，這會對模型的泛化能力與實用性產生挑戰。</a:t>
+            </a:r>
+          </a:p>
+          <a:p>
+            <a:endParaRPr lang="zh-TW" altLang="en-US" dirty="0"/>
           </a:p>
         </p:txBody>
       </p:sp>
@@ -2425,7 +2527,7 @@
     </p:spTree>
     <p:extLst>
       <p:ext uri="{BB962C8B-B14F-4D97-AF65-F5344CB8AC3E}">
-        <p14:creationId xmlns:p14="http://schemas.microsoft.com/office/powerpoint/2010/main" val="2110887726"/>
+        <p14:creationId xmlns:p14="http://schemas.microsoft.com/office/powerpoint/2010/main" val="3072678274"/>
       </p:ext>
     </p:extLst>
   </p:cSld>
@@ -2481,7 +2583,19 @@
           <a:p>
             <a:r>
               <a:rPr lang="zh-TW" altLang="en-US" dirty="0"/>
-              <a:t>以上是我們的報告內容，謝謝大家的聆聽。接下來歡迎大家提問，我們會盡力回答。</a:t>
+              <a:t>我們這次報告主要參考了論文原文與幾篇深入解釋 </a:t>
+            </a:r>
+            <a:r>
+              <a:rPr lang="en-US" altLang="zh-TW" dirty="0" err="1"/>
+              <a:t>DeepONet</a:t>
+            </a:r>
+            <a:r>
+              <a:rPr lang="en-US" altLang="zh-TW" dirty="0"/>
+              <a:t> </a:t>
+            </a:r>
+            <a:r>
+              <a:rPr lang="zh-TW" altLang="en-US" dirty="0"/>
+              <a:t>的文章，有興趣的同學也可以再深入閱讀。</a:t>
             </a:r>
           </a:p>
         </p:txBody>
@@ -2504,6 +2618,93 @@
             <a:fld id="{53F37B9E-6BA1-42D6-AAD5-58D48F5C5ABC}" type="slidenum">
               <a:rPr lang="zh-TW" altLang="en-US" smtClean="0"/>
               <a:t>29</a:t>
+            </a:fld>
+            <a:endParaRPr lang="zh-TW" altLang="en-US"/>
+          </a:p>
+        </p:txBody>
+      </p:sp>
+    </p:spTree>
+    <p:extLst>
+      <p:ext uri="{BB962C8B-B14F-4D97-AF65-F5344CB8AC3E}">
+        <p14:creationId xmlns:p14="http://schemas.microsoft.com/office/powerpoint/2010/main" val="2110887726"/>
+      </p:ext>
+    </p:extLst>
+  </p:cSld>
+  <p:clrMapOvr>
+    <a:masterClrMapping/>
+  </p:clrMapOvr>
+</p:notes>
+</file>
+
+<file path=ppt/notesSlides/notesSlide27.xml><?xml version="1.0" encoding="utf-8"?>
+<p:notes xmlns:a="http://schemas.openxmlformats.org/drawingml/2006/main" xmlns:r="http://schemas.openxmlformats.org/officeDocument/2006/relationships" xmlns:p="http://schemas.openxmlformats.org/presentationml/2006/main">
+  <p:cSld>
+    <p:spTree>
+      <p:nvGrpSpPr>
+        <p:cNvPr id="1" name=""/>
+        <p:cNvGrpSpPr/>
+        <p:nvPr/>
+      </p:nvGrpSpPr>
+      <p:grpSpPr>
+        <a:xfrm>
+          <a:off x="0" y="0"/>
+          <a:ext cx="0" cy="0"/>
+          <a:chOff x="0" y="0"/>
+          <a:chExt cx="0" cy="0"/>
+        </a:xfrm>
+      </p:grpSpPr>
+      <p:sp>
+        <p:nvSpPr>
+          <p:cNvPr id="2" name="投影片影像版面配置區 1"/>
+          <p:cNvSpPr>
+            <a:spLocks noGrp="1" noRot="1" noChangeAspect="1"/>
+          </p:cNvSpPr>
+          <p:nvPr>
+            <p:ph type="sldImg"/>
+          </p:nvPr>
+        </p:nvSpPr>
+        <p:spPr/>
+      </p:sp>
+      <p:sp>
+        <p:nvSpPr>
+          <p:cNvPr id="3" name="備忘稿版面配置區 2"/>
+          <p:cNvSpPr>
+            <a:spLocks noGrp="1"/>
+          </p:cNvSpPr>
+          <p:nvPr>
+            <p:ph type="body" idx="1"/>
+          </p:nvPr>
+        </p:nvSpPr>
+        <p:spPr/>
+        <p:txBody>
+          <a:bodyPr/>
+          <a:lstStyle/>
+          <a:p>
+            <a:r>
+              <a:rPr lang="zh-TW" altLang="en-US" dirty="0"/>
+              <a:t>以上是我們的報告內容，謝謝大家的聆聽。接下來歡迎大家提問，我們會盡力回答。</a:t>
+            </a:r>
+          </a:p>
+        </p:txBody>
+      </p:sp>
+      <p:sp>
+        <p:nvSpPr>
+          <p:cNvPr id="4" name="投影片編號版面配置區 3"/>
+          <p:cNvSpPr>
+            <a:spLocks noGrp="1"/>
+          </p:cNvSpPr>
+          <p:nvPr>
+            <p:ph type="sldNum" sz="quarter" idx="5"/>
+          </p:nvPr>
+        </p:nvSpPr>
+        <p:spPr/>
+        <p:txBody>
+          <a:bodyPr/>
+          <a:lstStyle/>
+          <a:p>
+            <a:fld id="{53F37B9E-6BA1-42D6-AAD5-58D48F5C5ABC}" type="slidenum">
+              <a:rPr lang="zh-TW" altLang="en-US" smtClean="0"/>
+              <a:t>30</a:t>
             </a:fld>
             <a:endParaRPr lang="zh-TW" altLang="en-US"/>
           </a:p>
@@ -16329,7 +16530,7 @@
           <p:cNvPr id="2" name="標題 1">
             <a:extLst>
               <a:ext uri="{FF2B5EF4-FFF2-40B4-BE49-F238E27FC236}">
-                <a16:creationId xmlns:a16="http://schemas.microsoft.com/office/drawing/2014/main" id="{ABA637F9-1E8D-4CB8-A95F-510FB326B797}"/>
+                <a16:creationId xmlns:a16="http://schemas.microsoft.com/office/drawing/2014/main" id="{FE3B101A-36A0-4F1E-8A9F-65119F416737}"/>
               </a:ext>
             </a:extLst>
           </p:cNvPr>
@@ -16346,11 +16547,25 @@
           <a:lstStyle/>
           <a:p>
             <a:r>
+              <a:rPr lang="en-US" altLang="zh-TW" dirty="0" err="1">
+                <a:latin typeface="微軟正黑體" panose="020B0604030504040204" pitchFamily="34" charset="-120"/>
+                <a:ea typeface="微軟正黑體" panose="020B0604030504040204" pitchFamily="34" charset="-120"/>
+              </a:rPr>
+              <a:t>DeepONet</a:t>
+            </a:r>
+            <a:r>
+              <a:rPr lang="en-US" altLang="zh-TW" dirty="0">
+                <a:latin typeface="微軟正黑體" panose="020B0604030504040204" pitchFamily="34" charset="-120"/>
+                <a:ea typeface="微軟正黑體" panose="020B0604030504040204" pitchFamily="34" charset="-120"/>
+              </a:rPr>
+              <a:t> </a:t>
+            </a:r>
+            <a:r>
               <a:rPr lang="zh-TW" altLang="en-US" dirty="0">
                 <a:latin typeface="微軟正黑體" panose="020B0604030504040204" pitchFamily="34" charset="-120"/>
                 <a:ea typeface="微軟正黑體" panose="020B0604030504040204" pitchFamily="34" charset="-120"/>
               </a:rPr>
-              <a:t>參考文獻</a:t>
+              <a:t>的主要挑戰與局限</a:t>
             </a:r>
           </a:p>
         </p:txBody>
@@ -16360,7 +16575,7 @@
           <p:cNvPr id="3" name="內容版面配置區 2">
             <a:extLst>
               <a:ext uri="{FF2B5EF4-FFF2-40B4-BE49-F238E27FC236}">
-                <a16:creationId xmlns:a16="http://schemas.microsoft.com/office/drawing/2014/main" id="{1C9AB9BB-00BB-4D2F-82B9-B7848F5A0F93}"/>
+                <a16:creationId xmlns:a16="http://schemas.microsoft.com/office/drawing/2014/main" id="{92FD5844-068B-45F4-9FD3-F0B6EE9098E9}"/>
               </a:ext>
             </a:extLst>
           </p:cNvPr>
@@ -16378,114 +16593,250 @@
           </a:bodyPr>
           <a:lstStyle/>
           <a:p>
-            <a:r>
-              <a:rPr lang="en-US" altLang="zh-TW" sz="2000" dirty="0"/>
-              <a:t>[1] </a:t>
-            </a:r>
-            <a:r>
-              <a:rPr lang="en-US" altLang="zh-TW" sz="2000" b="1" dirty="0"/>
-              <a:t>Learning nonlinear operators via </a:t>
-            </a:r>
-            <a:r>
-              <a:rPr lang="en-US" altLang="zh-TW" sz="2000" b="1" dirty="0" err="1"/>
+            <a:pPr marL="457200" indent="-457200">
+              <a:buFont typeface="+mj-lt"/>
+              <a:buAutoNum type="arabicPeriod"/>
+            </a:pPr>
+            <a:r>
+              <a:rPr lang="zh-TW" altLang="en-US" sz="2400" b="1" dirty="0">
+                <a:latin typeface="微軟正黑體" panose="020B0604030504040204" pitchFamily="34" charset="-120"/>
+                <a:ea typeface="微軟正黑體" panose="020B0604030504040204" pitchFamily="34" charset="-120"/>
+              </a:rPr>
+              <a:t>算力需求較高</a:t>
+            </a:r>
+            <a:r>
+              <a:rPr lang="zh-TW" altLang="en-US" sz="2400" dirty="0">
+                <a:latin typeface="微軟正黑體" panose="020B0604030504040204" pitchFamily="34" charset="-120"/>
+                <a:ea typeface="微軟正黑體" panose="020B0604030504040204" pitchFamily="34" charset="-120"/>
+              </a:rPr>
+              <a:t>：訓練 </a:t>
+            </a:r>
+            <a:r>
+              <a:rPr lang="en-US" altLang="zh-TW" sz="2400" dirty="0" err="1">
+                <a:latin typeface="微軟正黑體" panose="020B0604030504040204" pitchFamily="34" charset="-120"/>
+                <a:ea typeface="微軟正黑體" panose="020B0604030504040204" pitchFamily="34" charset="-120"/>
+              </a:rPr>
               <a:t>DeepONet</a:t>
             </a:r>
             <a:r>
-              <a:rPr lang="en-US" altLang="zh-TW" sz="2000" b="1" dirty="0"/>
-              <a:t> based on the universal approximation theorem of operators </a:t>
-            </a:r>
-            <a:r>
-              <a:rPr lang="en-US" altLang="zh-TW" sz="2000" dirty="0"/>
-              <a:t>https://www.nature.com/articles/s42256-021-00302-5</a:t>
-            </a:r>
-          </a:p>
-          <a:p>
-            <a:r>
-              <a:rPr lang="en-US" altLang="zh-TW" sz="2000" dirty="0"/>
-              <a:t>[2] </a:t>
-            </a:r>
-            <a:r>
-              <a:rPr lang="en-US" altLang="zh-TW" sz="2000" b="1" dirty="0"/>
-              <a:t>Physics-informed machine learning </a:t>
-            </a:r>
-            <a:r>
-              <a:rPr lang="en-US" altLang="zh-TW" sz="2000" dirty="0"/>
-              <a:t>https://www.nature.com/articles/s42254-021-00314-5</a:t>
-            </a:r>
-          </a:p>
-          <a:p>
-            <a:r>
-              <a:rPr lang="en-US" altLang="zh-TW" sz="2000" dirty="0"/>
-              <a:t>[3] </a:t>
-            </a:r>
-            <a:r>
-              <a:rPr lang="en-US" altLang="zh-TW" sz="2000" b="1" dirty="0"/>
-              <a:t>AI</a:t>
-            </a:r>
-            <a:r>
-              <a:rPr lang="zh-TW" altLang="en-US" sz="2000" b="1" dirty="0"/>
-              <a:t>与</a:t>
-            </a:r>
-            <a:r>
-              <a:rPr lang="en-US" altLang="zh-TW" sz="2000" b="1" dirty="0"/>
-              <a:t>PDE</a:t>
-            </a:r>
-            <a:r>
-              <a:rPr lang="zh-TW" altLang="en-US" sz="2000" b="1" dirty="0"/>
-              <a:t>（三）：大概是最好懂的</a:t>
-            </a:r>
-            <a:r>
-              <a:rPr lang="en-US" altLang="zh-TW" sz="2000" b="1" dirty="0" err="1"/>
+              <a:rPr lang="en-US" altLang="zh-TW" sz="2400" dirty="0">
+                <a:latin typeface="微軟正黑體" panose="020B0604030504040204" pitchFamily="34" charset="-120"/>
+                <a:ea typeface="微軟正黑體" panose="020B0604030504040204" pitchFamily="34" charset="-120"/>
+              </a:rPr>
+              <a:t> </a:t>
+            </a:r>
+            <a:r>
+              <a:rPr lang="zh-TW" altLang="en-US" sz="2400" dirty="0">
+                <a:latin typeface="微軟正黑體" panose="020B0604030504040204" pitchFamily="34" charset="-120"/>
+                <a:ea typeface="微軟正黑體" panose="020B0604030504040204" pitchFamily="34" charset="-120"/>
+              </a:rPr>
+              <a:t>需要高計算資源，尤其是大規模運算符學習時，可能會遇到內存與算力的瓶頸。</a:t>
+            </a:r>
+            <a:endParaRPr lang="en-US" altLang="zh-TW" sz="2400" dirty="0">
+              <a:latin typeface="微軟正黑體" panose="020B0604030504040204" pitchFamily="34" charset="-120"/>
+              <a:ea typeface="微軟正黑體" panose="020B0604030504040204" pitchFamily="34" charset="-120"/>
+            </a:endParaRPr>
+          </a:p>
+          <a:p>
+            <a:pPr marL="457200" indent="-457200">
+              <a:buFont typeface="+mj-lt"/>
+              <a:buAutoNum type="arabicPeriod"/>
+            </a:pPr>
+            <a:endParaRPr lang="en-US" altLang="zh-TW" sz="2400" dirty="0">
+              <a:latin typeface="微軟正黑體" panose="020B0604030504040204" pitchFamily="34" charset="-120"/>
+              <a:ea typeface="微軟正黑體" panose="020B0604030504040204" pitchFamily="34" charset="-120"/>
+            </a:endParaRPr>
+          </a:p>
+          <a:p>
+            <a:pPr marL="457200" indent="-457200">
+              <a:buFont typeface="+mj-lt"/>
+              <a:buAutoNum type="arabicPeriod"/>
+            </a:pPr>
+            <a:r>
+              <a:rPr lang="zh-TW" altLang="en-US" sz="2400" b="1" dirty="0">
+                <a:latin typeface="微軟正黑體" panose="020B0604030504040204" pitchFamily="34" charset="-120"/>
+                <a:ea typeface="微軟正黑體" panose="020B0604030504040204" pitchFamily="34" charset="-120"/>
+              </a:rPr>
+              <a:t>缺乏物理可解釋性</a:t>
+            </a:r>
+            <a:r>
+              <a:rPr lang="zh-TW" altLang="en-US" sz="2400" dirty="0">
+                <a:latin typeface="微軟正黑體" panose="020B0604030504040204" pitchFamily="34" charset="-120"/>
+                <a:ea typeface="微軟正黑體" panose="020B0604030504040204" pitchFamily="34" charset="-120"/>
+              </a:rPr>
+              <a:t>：雖然 </a:t>
+            </a:r>
+            <a:r>
+              <a:rPr lang="en-US" altLang="zh-TW" sz="2400" dirty="0" err="1">
+                <a:latin typeface="微軟正黑體" panose="020B0604030504040204" pitchFamily="34" charset="-120"/>
+                <a:ea typeface="微軟正黑體" panose="020B0604030504040204" pitchFamily="34" charset="-120"/>
+              </a:rPr>
               <a:t>DeepONet</a:t>
             </a:r>
             <a:r>
-              <a:rPr lang="zh-TW" altLang="en-US" sz="2000" b="1" dirty="0"/>
-              <a:t>模型解析</a:t>
-            </a:r>
-            <a:r>
-              <a:rPr lang="en-US" altLang="zh-TW" sz="2000" dirty="0"/>
-              <a:t>https://zhuanlan.zhihu.com/p/514148390</a:t>
-            </a:r>
-          </a:p>
-          <a:p>
-            <a:r>
-              <a:rPr lang="en-US" altLang="zh-TW" sz="2000" dirty="0"/>
-              <a:t>[4] </a:t>
-            </a:r>
-            <a:r>
-              <a:rPr lang="en-US" altLang="zh-TW" sz="2000" b="1" i="0" dirty="0" err="1">
-                <a:solidFill>
-                  <a:srgbClr val="242424"/>
-                </a:solidFill>
+              <a:rPr lang="en-US" altLang="zh-TW" sz="2400" dirty="0">
+                <a:latin typeface="微軟正黑體" panose="020B0604030504040204" pitchFamily="34" charset="-120"/>
+                <a:ea typeface="微軟正黑體" panose="020B0604030504040204" pitchFamily="34" charset="-120"/>
+              </a:rPr>
+              <a:t> </a:t>
+            </a:r>
+            <a:r>
+              <a:rPr lang="zh-TW" altLang="en-US" sz="2400" dirty="0">
+                <a:latin typeface="微軟正黑體" panose="020B0604030504040204" pitchFamily="34" charset="-120"/>
+                <a:ea typeface="微軟正黑體" panose="020B0604030504040204" pitchFamily="34" charset="-120"/>
+              </a:rPr>
+              <a:t>可以學習運算符，但它不像傳統數值方法那樣提供明確的數學結構或可解釋性。</a:t>
+            </a:r>
+            <a:endParaRPr lang="en-US" altLang="zh-TW" sz="2400" dirty="0">
+              <a:latin typeface="微軟正黑體" panose="020B0604030504040204" pitchFamily="34" charset="-120"/>
+              <a:ea typeface="微軟正黑體" panose="020B0604030504040204" pitchFamily="34" charset="-120"/>
+            </a:endParaRPr>
+          </a:p>
+          <a:p>
+            <a:pPr marL="457200" indent="-457200">
+              <a:buFont typeface="+mj-lt"/>
+              <a:buAutoNum type="arabicPeriod"/>
+            </a:pPr>
+            <a:endParaRPr lang="en-US" altLang="zh-TW" sz="2400" dirty="0">
+              <a:latin typeface="微軟正黑體" panose="020B0604030504040204" pitchFamily="34" charset="-120"/>
+              <a:ea typeface="微軟正黑體" panose="020B0604030504040204" pitchFamily="34" charset="-120"/>
+            </a:endParaRPr>
+          </a:p>
+          <a:p>
+            <a:pPr marL="457200" lvl="0" indent="-457200">
+              <a:buFont typeface="+mj-lt"/>
+              <a:buAutoNum type="arabicPeriod"/>
+              <a:tabLst>
+                <a:tab pos="457200" algn="l"/>
+              </a:tabLst>
+            </a:pPr>
+            <a:r>
+              <a:rPr lang="zh-TW" altLang="zh-TW" sz="2400" b="1" kern="0" dirty="0">
                 <a:effectLst/>
-                <a:latin typeface="sohne"/>
+                <a:latin typeface="微軟正黑體" panose="020B0604030504040204" pitchFamily="34" charset="-120"/>
+                <a:ea typeface="微軟正黑體" panose="020B0604030504040204" pitchFamily="34" charset="-120"/>
+                <a:cs typeface="新細明體" panose="02020500000000000000" pitchFamily="18" charset="-120"/>
+              </a:rPr>
+              <a:t>邊界條件與初始條件的依賴性</a:t>
+            </a:r>
+            <a:r>
+              <a:rPr lang="zh-TW" altLang="en-US" sz="2400" kern="100" dirty="0">
+                <a:latin typeface="微軟正黑體" panose="020B0604030504040204" pitchFamily="34" charset="-120"/>
+                <a:ea typeface="微軟正黑體" panose="020B0604030504040204" pitchFamily="34" charset="-120"/>
+                <a:cs typeface="Times New Roman" panose="02020603050405020304" pitchFamily="18" charset="0"/>
+              </a:rPr>
+              <a:t>：</a:t>
+            </a:r>
+            <a:r>
+              <a:rPr lang="zh-TW" altLang="zh-TW" sz="2400" kern="0" dirty="0">
+                <a:effectLst/>
+                <a:latin typeface="微軟正黑體" panose="020B0604030504040204" pitchFamily="34" charset="-120"/>
+                <a:ea typeface="微軟正黑體" panose="020B0604030504040204" pitchFamily="34" charset="-120"/>
+                <a:cs typeface="新細明體" panose="02020500000000000000" pitchFamily="18" charset="-120"/>
+              </a:rPr>
+              <a:t>如果運算符涉及</a:t>
+            </a:r>
+            <a:r>
+              <a:rPr lang="en-US" altLang="zh-TW" sz="2400" kern="0" dirty="0">
+                <a:effectLst/>
+                <a:latin typeface="微軟正黑體" panose="020B0604030504040204" pitchFamily="34" charset="-120"/>
+                <a:ea typeface="微軟正黑體" panose="020B0604030504040204" pitchFamily="34" charset="-120"/>
+                <a:cs typeface="新細明體" panose="02020500000000000000" pitchFamily="18" charset="-120"/>
+              </a:rPr>
+              <a:t> PDE</a:t>
+            </a:r>
+            <a:r>
+              <a:rPr lang="zh-TW" altLang="zh-TW" sz="2400" kern="0" dirty="0">
+                <a:effectLst/>
+                <a:latin typeface="微軟正黑體" panose="020B0604030504040204" pitchFamily="34" charset="-120"/>
+                <a:ea typeface="微軟正黑體" panose="020B0604030504040204" pitchFamily="34" charset="-120"/>
+                <a:cs typeface="新細明體" panose="02020500000000000000" pitchFamily="18" charset="-120"/>
+              </a:rPr>
+              <a:t>，</a:t>
+            </a:r>
+            <a:r>
+              <a:rPr lang="en-US" altLang="zh-TW" sz="2400" kern="0" dirty="0" err="1">
+                <a:effectLst/>
+                <a:latin typeface="微軟正黑體" panose="020B0604030504040204" pitchFamily="34" charset="-120"/>
+                <a:ea typeface="微軟正黑體" panose="020B0604030504040204" pitchFamily="34" charset="-120"/>
+                <a:cs typeface="新細明體" panose="02020500000000000000" pitchFamily="18" charset="-120"/>
               </a:rPr>
               <a:t>DeepONet</a:t>
             </a:r>
             <a:r>
-              <a:rPr lang="en-US" altLang="zh-TW" sz="2000" b="1" i="0" dirty="0">
-                <a:solidFill>
-                  <a:srgbClr val="242424"/>
-                </a:solidFill>
+              <a:rPr lang="en-US" altLang="zh-TW" sz="2400" kern="0" dirty="0">
                 <a:effectLst/>
-                <a:latin typeface="sohne"/>
-              </a:rPr>
-              <a:t>: Can Deep Learning finally tame Nonlinear Operators? </a:t>
-            </a:r>
-            <a:r>
-              <a:rPr lang="en-US" altLang="zh-TW" sz="2000" dirty="0"/>
-              <a:t>https://medium.com/data-science-collective/deeponet-can-deep-learning-finally-tame-nonlinear-operators-738721dcd6bf</a:t>
-            </a:r>
-            <a:endParaRPr lang="zh-TW" altLang="en-US" sz="2000" dirty="0"/>
-          </a:p>
-        </p:txBody>
-      </p:sp>
-      <p:sp>
-        <p:nvSpPr>
-          <p:cNvPr id="4" name="投影片編號版面配置區 3">
+                <a:latin typeface="微軟正黑體" panose="020B0604030504040204" pitchFamily="34" charset="-120"/>
+                <a:ea typeface="微軟正黑體" panose="020B0604030504040204" pitchFamily="34" charset="-120"/>
+                <a:cs typeface="新細明體" panose="02020500000000000000" pitchFamily="18" charset="-120"/>
+              </a:rPr>
+              <a:t> </a:t>
+            </a:r>
+            <a:r>
+              <a:rPr lang="zh-TW" altLang="zh-TW" sz="2400" kern="0" dirty="0">
+                <a:effectLst/>
+                <a:latin typeface="微軟正黑體" panose="020B0604030504040204" pitchFamily="34" charset="-120"/>
+                <a:ea typeface="微軟正黑體" panose="020B0604030504040204" pitchFamily="34" charset="-120"/>
+                <a:cs typeface="新細明體" panose="02020500000000000000" pitchFamily="18" charset="-120"/>
+              </a:rPr>
+              <a:t>可能會對邊界條件或初始條件極度敏感，導致預測不夠穩定。</a:t>
+            </a:r>
+            <a:endParaRPr lang="zh-TW" altLang="zh-TW" sz="2400" kern="100" dirty="0">
+              <a:effectLst/>
+              <a:latin typeface="微軟正黑體" panose="020B0604030504040204" pitchFamily="34" charset="-120"/>
+              <a:ea typeface="微軟正黑體" panose="020B0604030504040204" pitchFamily="34" charset="-120"/>
+              <a:cs typeface="Times New Roman" panose="02020603050405020304" pitchFamily="18" charset="0"/>
+            </a:endParaRPr>
+          </a:p>
+          <a:p>
+            <a:endParaRPr lang="zh-TW" altLang="en-US" dirty="0"/>
+          </a:p>
+          <a:p>
+            <a:endParaRPr lang="zh-TW" altLang="en-US" dirty="0"/>
+          </a:p>
+          <a:p>
+            <a:endParaRPr lang="zh-TW" altLang="en-US" dirty="0"/>
+          </a:p>
+        </p:txBody>
+      </p:sp>
+      <p:sp>
+        <p:nvSpPr>
+          <p:cNvPr id="4" name="頁尾版面配置區 3">
             <a:extLst>
               <a:ext uri="{FF2B5EF4-FFF2-40B4-BE49-F238E27FC236}">
-                <a16:creationId xmlns:a16="http://schemas.microsoft.com/office/drawing/2014/main" id="{97C28B9B-6372-4C4D-97BF-EF312B491161}"/>
+                <a16:creationId xmlns:a16="http://schemas.microsoft.com/office/drawing/2014/main" id="{AF299871-B85D-4C8D-B3F4-F9D63856EEAD}"/>
+              </a:ext>
+            </a:extLst>
+          </p:cNvPr>
+          <p:cNvSpPr>
+            <a:spLocks noGrp="1"/>
+          </p:cNvSpPr>
+          <p:nvPr>
+            <p:ph type="ftr" sz="quarter" idx="11"/>
+          </p:nvPr>
+        </p:nvSpPr>
+        <p:spPr/>
+        <p:txBody>
+          <a:bodyPr/>
+          <a:lstStyle/>
+          <a:p>
+            <a:r>
+              <a:rPr lang="en-US" altLang="zh-TW" sz="900">
+                <a:latin typeface="微軟正黑體" panose="020B0604030504040204" pitchFamily="34" charset="-120"/>
+                <a:ea typeface="微軟正黑體" panose="020B0604030504040204" pitchFamily="34" charset="-120"/>
+              </a:rPr>
+              <a:t>Learning nonlinear operators via DeepONet based on the universal approximation theorem of operators</a:t>
+            </a:r>
+            <a:endParaRPr lang="zh-TW" altLang="en-US" dirty="0"/>
+          </a:p>
+        </p:txBody>
+      </p:sp>
+      <p:sp>
+        <p:nvSpPr>
+          <p:cNvPr id="5" name="投影片編號版面配置區 4">
+            <a:extLst>
+              <a:ext uri="{FF2B5EF4-FFF2-40B4-BE49-F238E27FC236}">
+                <a16:creationId xmlns:a16="http://schemas.microsoft.com/office/drawing/2014/main" id="{B913271A-27FE-40AB-809D-5A2109AFE61E}"/>
               </a:ext>
             </a:extLst>
           </p:cNvPr>
@@ -16510,42 +16861,10 @@
           </a:p>
         </p:txBody>
       </p:sp>
-      <p:sp>
-        <p:nvSpPr>
-          <p:cNvPr id="5" name="頁尾版面配置區 4">
-            <a:extLst>
-              <a:ext uri="{FF2B5EF4-FFF2-40B4-BE49-F238E27FC236}">
-                <a16:creationId xmlns:a16="http://schemas.microsoft.com/office/drawing/2014/main" id="{17FD8817-88BA-4465-BA61-1A2E311D465C}"/>
-              </a:ext>
-            </a:extLst>
-          </p:cNvPr>
-          <p:cNvSpPr>
-            <a:spLocks noGrp="1"/>
-          </p:cNvSpPr>
-          <p:nvPr>
-            <p:ph type="ftr" sz="quarter" idx="11"/>
-          </p:nvPr>
-        </p:nvSpPr>
-        <p:spPr/>
-        <p:txBody>
-          <a:bodyPr/>
-          <a:lstStyle/>
-          <a:p>
-            <a:r>
-              <a:rPr lang="en-US" altLang="zh-TW" sz="900">
-                <a:latin typeface="微軟正黑體" panose="020B0604030504040204" pitchFamily="34" charset="-120"/>
-                <a:ea typeface="微軟正黑體" panose="020B0604030504040204" pitchFamily="34" charset="-120"/>
-              </a:rPr>
-              <a:t>Learning nonlinear operators via DeepONet based on the universal approximation theorem of operators</a:t>
-            </a:r>
-            <a:endParaRPr lang="zh-TW" altLang="en-US" dirty="0"/>
-          </a:p>
-        </p:txBody>
-      </p:sp>
     </p:spTree>
     <p:extLst>
       <p:ext uri="{BB962C8B-B14F-4D97-AF65-F5344CB8AC3E}">
-        <p14:creationId xmlns:p14="http://schemas.microsoft.com/office/powerpoint/2010/main" val="3582090742"/>
+        <p14:creationId xmlns:p14="http://schemas.microsoft.com/office/powerpoint/2010/main" val="930331225"/>
       </p:ext>
     </p:extLst>
   </p:cSld>
@@ -16577,7 +16896,7 @@
           <p:cNvPr id="2" name="標題 1">
             <a:extLst>
               <a:ext uri="{FF2B5EF4-FFF2-40B4-BE49-F238E27FC236}">
-                <a16:creationId xmlns:a16="http://schemas.microsoft.com/office/drawing/2014/main" id="{12401544-758A-4794-80BE-1BE255131E0E}"/>
+                <a16:creationId xmlns:a16="http://schemas.microsoft.com/office/drawing/2014/main" id="{ABA637F9-1E8D-4CB8-A95F-510FB326B797}"/>
               </a:ext>
             </a:extLst>
           </p:cNvPr>
@@ -16594,10 +16913,12 @@
           <a:lstStyle/>
           <a:p>
             <a:r>
-              <a:rPr lang="en-US" altLang="zh-TW" dirty="0"/>
-              <a:t>Q&amp;A</a:t>
-            </a:r>
-            <a:endParaRPr lang="zh-TW" altLang="en-US" dirty="0"/>
+              <a:rPr lang="zh-TW" altLang="en-US" dirty="0">
+                <a:latin typeface="微軟正黑體" panose="020B0604030504040204" pitchFamily="34" charset="-120"/>
+                <a:ea typeface="微軟正黑體" panose="020B0604030504040204" pitchFamily="34" charset="-120"/>
+              </a:rPr>
+              <a:t>參考文獻</a:t>
+            </a:r>
           </a:p>
         </p:txBody>
       </p:sp>
@@ -16606,7 +16927,7 @@
           <p:cNvPr id="3" name="內容版面配置區 2">
             <a:extLst>
               <a:ext uri="{FF2B5EF4-FFF2-40B4-BE49-F238E27FC236}">
-                <a16:creationId xmlns:a16="http://schemas.microsoft.com/office/drawing/2014/main" id="{81130535-4815-4F4E-B456-54F2BAC8322B}"/>
+                <a16:creationId xmlns:a16="http://schemas.microsoft.com/office/drawing/2014/main" id="{1C9AB9BB-00BB-4D2F-82B9-B7848F5A0F93}"/>
               </a:ext>
             </a:extLst>
           </p:cNvPr>
@@ -16619,10 +16940,110 @@
         </p:nvSpPr>
         <p:spPr/>
         <p:txBody>
-          <a:bodyPr/>
+          <a:bodyPr>
+            <a:normAutofit/>
+          </a:bodyPr>
           <a:lstStyle/>
           <a:p>
-            <a:endParaRPr lang="zh-TW" altLang="en-US"/>
+            <a:r>
+              <a:rPr lang="en-US" altLang="zh-TW" sz="2000" dirty="0"/>
+              <a:t>[1] </a:t>
+            </a:r>
+            <a:r>
+              <a:rPr lang="en-US" altLang="zh-TW" sz="2000" b="1" dirty="0"/>
+              <a:t>Learning nonlinear operators via </a:t>
+            </a:r>
+            <a:r>
+              <a:rPr lang="en-US" altLang="zh-TW" sz="2000" b="1" dirty="0" err="1"/>
+              <a:t>DeepONet</a:t>
+            </a:r>
+            <a:r>
+              <a:rPr lang="en-US" altLang="zh-TW" sz="2000" b="1" dirty="0"/>
+              <a:t> based on the universal approximation theorem of operators </a:t>
+            </a:r>
+            <a:r>
+              <a:rPr lang="en-US" altLang="zh-TW" sz="2000" dirty="0"/>
+              <a:t>https://www.nature.com/articles/s42256-021-00302-5</a:t>
+            </a:r>
+          </a:p>
+          <a:p>
+            <a:r>
+              <a:rPr lang="en-US" altLang="zh-TW" sz="2000" dirty="0"/>
+              <a:t>[2] </a:t>
+            </a:r>
+            <a:r>
+              <a:rPr lang="en-US" altLang="zh-TW" sz="2000" b="1" dirty="0"/>
+              <a:t>Physics-informed machine learning </a:t>
+            </a:r>
+            <a:r>
+              <a:rPr lang="en-US" altLang="zh-TW" sz="2000" dirty="0"/>
+              <a:t>https://www.nature.com/articles/s42254-021-00314-5</a:t>
+            </a:r>
+          </a:p>
+          <a:p>
+            <a:r>
+              <a:rPr lang="en-US" altLang="zh-TW" sz="2000" dirty="0"/>
+              <a:t>[3] </a:t>
+            </a:r>
+            <a:r>
+              <a:rPr lang="en-US" altLang="zh-TW" sz="2000" b="1" dirty="0"/>
+              <a:t>AI</a:t>
+            </a:r>
+            <a:r>
+              <a:rPr lang="zh-TW" altLang="en-US" sz="2000" b="1" dirty="0"/>
+              <a:t>与</a:t>
+            </a:r>
+            <a:r>
+              <a:rPr lang="en-US" altLang="zh-TW" sz="2000" b="1" dirty="0"/>
+              <a:t>PDE</a:t>
+            </a:r>
+            <a:r>
+              <a:rPr lang="zh-TW" altLang="en-US" sz="2000" b="1" dirty="0"/>
+              <a:t>（三）：大概是最好懂的</a:t>
+            </a:r>
+            <a:r>
+              <a:rPr lang="en-US" altLang="zh-TW" sz="2000" b="1" dirty="0" err="1"/>
+              <a:t>DeepONet</a:t>
+            </a:r>
+            <a:r>
+              <a:rPr lang="zh-TW" altLang="en-US" sz="2000" b="1" dirty="0"/>
+              <a:t>模型解析</a:t>
+            </a:r>
+            <a:r>
+              <a:rPr lang="en-US" altLang="zh-TW" sz="2000" dirty="0"/>
+              <a:t>https://zhuanlan.zhihu.com/p/514148390</a:t>
+            </a:r>
+          </a:p>
+          <a:p>
+            <a:r>
+              <a:rPr lang="en-US" altLang="zh-TW" sz="2000" dirty="0"/>
+              <a:t>[4] </a:t>
+            </a:r>
+            <a:r>
+              <a:rPr lang="en-US" altLang="zh-TW" sz="2000" b="1" i="0" dirty="0" err="1">
+                <a:solidFill>
+                  <a:srgbClr val="242424"/>
+                </a:solidFill>
+                <a:effectLst/>
+                <a:latin typeface="sohne"/>
+              </a:rPr>
+              <a:t>DeepONet</a:t>
+            </a:r>
+            <a:r>
+              <a:rPr lang="en-US" altLang="zh-TW" sz="2000" b="1" i="0" dirty="0">
+                <a:solidFill>
+                  <a:srgbClr val="242424"/>
+                </a:solidFill>
+                <a:effectLst/>
+                <a:latin typeface="sohne"/>
+              </a:rPr>
+              <a:t>: Can Deep Learning finally tame Nonlinear Operators? </a:t>
+            </a:r>
+            <a:r>
+              <a:rPr lang="en-US" altLang="zh-TW" sz="2000" dirty="0"/>
+              <a:t>https://medium.com/data-science-collective/deeponet-can-deep-learning-finally-tame-nonlinear-operators-738721dcd6bf</a:t>
+            </a:r>
+            <a:endParaRPr lang="zh-TW" altLang="en-US" sz="2000" dirty="0"/>
           </a:p>
         </p:txBody>
       </p:sp>
@@ -16631,7 +17052,7 @@
           <p:cNvPr id="4" name="投影片編號版面配置區 3">
             <a:extLst>
               <a:ext uri="{FF2B5EF4-FFF2-40B4-BE49-F238E27FC236}">
-                <a16:creationId xmlns:a16="http://schemas.microsoft.com/office/drawing/2014/main" id="{A66A6C6B-4836-4A52-9C70-73C19A3FB8E7}"/>
+                <a16:creationId xmlns:a16="http://schemas.microsoft.com/office/drawing/2014/main" id="{97C28B9B-6372-4C4D-97BF-EF312B491161}"/>
               </a:ext>
             </a:extLst>
           </p:cNvPr>
@@ -16661,7 +17082,7 @@
           <p:cNvPr id="5" name="頁尾版面配置區 4">
             <a:extLst>
               <a:ext uri="{FF2B5EF4-FFF2-40B4-BE49-F238E27FC236}">
-                <a16:creationId xmlns:a16="http://schemas.microsoft.com/office/drawing/2014/main" id="{8944F441-7C63-4466-B834-327AE02ED7C2}"/>
+                <a16:creationId xmlns:a16="http://schemas.microsoft.com/office/drawing/2014/main" id="{17FD8817-88BA-4465-BA61-1A2E311D465C}"/>
               </a:ext>
             </a:extLst>
           </p:cNvPr>
@@ -16691,7 +17112,7 @@
     </p:spTree>
     <p:extLst>
       <p:ext uri="{BB962C8B-B14F-4D97-AF65-F5344CB8AC3E}">
-        <p14:creationId xmlns:p14="http://schemas.microsoft.com/office/powerpoint/2010/main" val="2610253944"/>
+        <p14:creationId xmlns:p14="http://schemas.microsoft.com/office/powerpoint/2010/main" val="3582090742"/>
       </p:ext>
     </p:extLst>
   </p:cSld>
@@ -16938,6 +17359,152 @@
     <p:extLst>
       <p:ext uri="{BB962C8B-B14F-4D97-AF65-F5344CB8AC3E}">
         <p14:creationId xmlns:p14="http://schemas.microsoft.com/office/powerpoint/2010/main" val="3740081078"/>
+      </p:ext>
+    </p:extLst>
+  </p:cSld>
+  <p:clrMapOvr>
+    <a:masterClrMapping/>
+  </p:clrMapOvr>
+</p:sld>
+</file>
+
+<file path=ppt/slides/slide30.xml><?xml version="1.0" encoding="utf-8"?>
+<p:sld xmlns:a="http://schemas.openxmlformats.org/drawingml/2006/main" xmlns:r="http://schemas.openxmlformats.org/officeDocument/2006/relationships" xmlns:p="http://schemas.openxmlformats.org/presentationml/2006/main">
+  <p:cSld>
+    <p:spTree>
+      <p:nvGrpSpPr>
+        <p:cNvPr id="1" name=""/>
+        <p:cNvGrpSpPr/>
+        <p:nvPr/>
+      </p:nvGrpSpPr>
+      <p:grpSpPr>
+        <a:xfrm>
+          <a:off x="0" y="0"/>
+          <a:ext cx="0" cy="0"/>
+          <a:chOff x="0" y="0"/>
+          <a:chExt cx="0" cy="0"/>
+        </a:xfrm>
+      </p:grpSpPr>
+      <p:sp>
+        <p:nvSpPr>
+          <p:cNvPr id="2" name="標題 1">
+            <a:extLst>
+              <a:ext uri="{FF2B5EF4-FFF2-40B4-BE49-F238E27FC236}">
+                <a16:creationId xmlns:a16="http://schemas.microsoft.com/office/drawing/2014/main" id="{12401544-758A-4794-80BE-1BE255131E0E}"/>
+              </a:ext>
+            </a:extLst>
+          </p:cNvPr>
+          <p:cNvSpPr>
+            <a:spLocks noGrp="1"/>
+          </p:cNvSpPr>
+          <p:nvPr>
+            <p:ph type="title"/>
+          </p:nvPr>
+        </p:nvSpPr>
+        <p:spPr/>
+        <p:txBody>
+          <a:bodyPr/>
+          <a:lstStyle/>
+          <a:p>
+            <a:r>
+              <a:rPr lang="en-US" altLang="zh-TW" dirty="0"/>
+              <a:t>Q&amp;A</a:t>
+            </a:r>
+            <a:endParaRPr lang="zh-TW" altLang="en-US" dirty="0"/>
+          </a:p>
+        </p:txBody>
+      </p:sp>
+      <p:sp>
+        <p:nvSpPr>
+          <p:cNvPr id="3" name="內容版面配置區 2">
+            <a:extLst>
+              <a:ext uri="{FF2B5EF4-FFF2-40B4-BE49-F238E27FC236}">
+                <a16:creationId xmlns:a16="http://schemas.microsoft.com/office/drawing/2014/main" id="{81130535-4815-4F4E-B456-54F2BAC8322B}"/>
+              </a:ext>
+            </a:extLst>
+          </p:cNvPr>
+          <p:cNvSpPr>
+            <a:spLocks noGrp="1"/>
+          </p:cNvSpPr>
+          <p:nvPr>
+            <p:ph idx="1"/>
+          </p:nvPr>
+        </p:nvSpPr>
+        <p:spPr/>
+        <p:txBody>
+          <a:bodyPr/>
+          <a:lstStyle/>
+          <a:p>
+            <a:endParaRPr lang="zh-TW" altLang="en-US"/>
+          </a:p>
+        </p:txBody>
+      </p:sp>
+      <p:sp>
+        <p:nvSpPr>
+          <p:cNvPr id="4" name="投影片編號版面配置區 3">
+            <a:extLst>
+              <a:ext uri="{FF2B5EF4-FFF2-40B4-BE49-F238E27FC236}">
+                <a16:creationId xmlns:a16="http://schemas.microsoft.com/office/drawing/2014/main" id="{A66A6C6B-4836-4A52-9C70-73C19A3FB8E7}"/>
+              </a:ext>
+            </a:extLst>
+          </p:cNvPr>
+          <p:cNvSpPr>
+            <a:spLocks noGrp="1"/>
+          </p:cNvSpPr>
+          <p:nvPr>
+            <p:ph type="sldNum" sz="quarter" idx="12"/>
+          </p:nvPr>
+        </p:nvSpPr>
+        <p:spPr/>
+        <p:txBody>
+          <a:bodyPr/>
+          <a:lstStyle/>
+          <a:p>
+            <a:fld id="{CA11ABBE-0EC4-402B-BC66-525261758A8B}" type="slidenum">
+              <a:rPr lang="zh-TW" altLang="en-US" smtClean="0"/>
+              <a:pPr/>
+              <a:t>30</a:t>
+            </a:fld>
+            <a:endParaRPr lang="zh-TW" altLang="en-US" dirty="0"/>
+          </a:p>
+        </p:txBody>
+      </p:sp>
+      <p:sp>
+        <p:nvSpPr>
+          <p:cNvPr id="5" name="頁尾版面配置區 4">
+            <a:extLst>
+              <a:ext uri="{FF2B5EF4-FFF2-40B4-BE49-F238E27FC236}">
+                <a16:creationId xmlns:a16="http://schemas.microsoft.com/office/drawing/2014/main" id="{8944F441-7C63-4466-B834-327AE02ED7C2}"/>
+              </a:ext>
+            </a:extLst>
+          </p:cNvPr>
+          <p:cNvSpPr>
+            <a:spLocks noGrp="1"/>
+          </p:cNvSpPr>
+          <p:nvPr>
+            <p:ph type="ftr" sz="quarter" idx="11"/>
+          </p:nvPr>
+        </p:nvSpPr>
+        <p:spPr/>
+        <p:txBody>
+          <a:bodyPr/>
+          <a:lstStyle/>
+          <a:p>
+            <a:r>
+              <a:rPr lang="en-US" altLang="zh-TW" sz="900">
+                <a:latin typeface="微軟正黑體" panose="020B0604030504040204" pitchFamily="34" charset="-120"/>
+                <a:ea typeface="微軟正黑體" panose="020B0604030504040204" pitchFamily="34" charset="-120"/>
+              </a:rPr>
+              <a:t>Learning nonlinear operators via DeepONet based on the universal approximation theorem of operators</a:t>
+            </a:r>
+            <a:endParaRPr lang="zh-TW" altLang="en-US" dirty="0"/>
+          </a:p>
+        </p:txBody>
+      </p:sp>
+    </p:spTree>
+    <p:extLst>
+      <p:ext uri="{BB962C8B-B14F-4D97-AF65-F5344CB8AC3E}">
+        <p14:creationId xmlns:p14="http://schemas.microsoft.com/office/powerpoint/2010/main" val="2610253944"/>
       </p:ext>
     </p:extLst>
   </p:cSld>

</xml_diff>